<commit_message>
les 04, and updated JEE Embedded Test support
</commit_message>
<xml_diff>
--- a/doc/intro/slides/lesson_04_ejb.pptx
+++ b/doc/intro/slides/lesson_04_ejb.pptx
@@ -5,7 +5,7 @@
     <p:sldMasterId id="2147483648" r:id="rId1"/>
   </p:sldMasterIdLst>
   <p:notesMasterIdLst>
-    <p:notesMasterId r:id="rId12"/>
+    <p:notesMasterId r:id="rId13"/>
   </p:notesMasterIdLst>
   <p:sldIdLst>
     <p:sldId id="256" r:id="rId2"/>
@@ -17,7 +17,8 @@
     <p:sldId id="280" r:id="rId8"/>
     <p:sldId id="281" r:id="rId9"/>
     <p:sldId id="282" r:id="rId10"/>
-    <p:sldId id="271" r:id="rId11"/>
+    <p:sldId id="283" r:id="rId11"/>
+    <p:sldId id="271" r:id="rId12"/>
   </p:sldIdLst>
   <p:sldSz cx="12192000" cy="6858000"/>
   <p:notesSz cx="6858000" cy="9144000"/>
@@ -206,7 +207,7 @@
           <a:p>
             <a:fld id="{9B5B52BA-3295-0343-9E28-A260A811DD10}" type="datetimeFigureOut">
               <a:rPr lang="en-US" smtClean="0"/>
-              <a:t>1/15/18</a:t>
+              <a:t>27-Nov-18</a:t>
             </a:fld>
             <a:endParaRPr lang="en-US"/>
           </a:p>
@@ -605,7 +606,7 @@
           <a:p>
             <a:fld id="{04F1D4A2-813C-F741-B481-C92B3A596030}" type="datetimeFigureOut">
               <a:rPr lang="en-US" smtClean="0"/>
-              <a:t>1/15/18</a:t>
+              <a:t>27-Nov-18</a:t>
             </a:fld>
             <a:endParaRPr lang="en-US"/>
           </a:p>
@@ -775,7 +776,7 @@
           <a:p>
             <a:fld id="{04F1D4A2-813C-F741-B481-C92B3A596030}" type="datetimeFigureOut">
               <a:rPr lang="en-US" smtClean="0"/>
-              <a:t>1/15/18</a:t>
+              <a:t>27-Nov-18</a:t>
             </a:fld>
             <a:endParaRPr lang="en-US"/>
           </a:p>
@@ -955,7 +956,7 @@
           <a:p>
             <a:fld id="{04F1D4A2-813C-F741-B481-C92B3A596030}" type="datetimeFigureOut">
               <a:rPr lang="en-US" smtClean="0"/>
-              <a:t>1/15/18</a:t>
+              <a:t>27-Nov-18</a:t>
             </a:fld>
             <a:endParaRPr lang="en-US"/>
           </a:p>
@@ -1136,7 +1137,7 @@
           <a:p>
             <a:fld id="{04F1D4A2-813C-F741-B481-C92B3A596030}" type="datetimeFigureOut">
               <a:rPr lang="en-US" smtClean="0"/>
-              <a:t>1/15/18</a:t>
+              <a:t>27-Nov-18</a:t>
             </a:fld>
             <a:endParaRPr lang="en-US"/>
           </a:p>
@@ -1382,7 +1383,7 @@
           <a:p>
             <a:fld id="{04F1D4A2-813C-F741-B481-C92B3A596030}" type="datetimeFigureOut">
               <a:rPr lang="en-US" smtClean="0"/>
-              <a:t>1/15/18</a:t>
+              <a:t>27-Nov-18</a:t>
             </a:fld>
             <a:endParaRPr lang="en-US"/>
           </a:p>
@@ -1614,7 +1615,7 @@
           <a:p>
             <a:fld id="{04F1D4A2-813C-F741-B481-C92B3A596030}" type="datetimeFigureOut">
               <a:rPr lang="en-US" smtClean="0"/>
-              <a:t>1/15/18</a:t>
+              <a:t>27-Nov-18</a:t>
             </a:fld>
             <a:endParaRPr lang="en-US"/>
           </a:p>
@@ -1981,7 +1982,7 @@
           <a:p>
             <a:fld id="{04F1D4A2-813C-F741-B481-C92B3A596030}" type="datetimeFigureOut">
               <a:rPr lang="en-US" smtClean="0"/>
-              <a:t>1/15/18</a:t>
+              <a:t>27-Nov-18</a:t>
             </a:fld>
             <a:endParaRPr lang="en-US"/>
           </a:p>
@@ -2099,7 +2100,7 @@
           <a:p>
             <a:fld id="{04F1D4A2-813C-F741-B481-C92B3A596030}" type="datetimeFigureOut">
               <a:rPr lang="en-US" smtClean="0"/>
-              <a:t>1/15/18</a:t>
+              <a:t>27-Nov-18</a:t>
             </a:fld>
             <a:endParaRPr lang="en-US"/>
           </a:p>
@@ -2194,7 +2195,7 @@
           <a:p>
             <a:fld id="{04F1D4A2-813C-F741-B481-C92B3A596030}" type="datetimeFigureOut">
               <a:rPr lang="en-US" smtClean="0"/>
-              <a:t>1/15/18</a:t>
+              <a:t>27-Nov-18</a:t>
             </a:fld>
             <a:endParaRPr lang="en-US"/>
           </a:p>
@@ -2471,7 +2472,7 @@
           <a:p>
             <a:fld id="{04F1D4A2-813C-F741-B481-C92B3A596030}" type="datetimeFigureOut">
               <a:rPr lang="en-US" smtClean="0"/>
-              <a:t>1/15/18</a:t>
+              <a:t>27-Nov-18</a:t>
             </a:fld>
             <a:endParaRPr lang="en-US"/>
           </a:p>
@@ -2724,7 +2725,7 @@
           <a:p>
             <a:fld id="{04F1D4A2-813C-F741-B481-C92B3A596030}" type="datetimeFigureOut">
               <a:rPr lang="en-US" smtClean="0"/>
-              <a:t>1/15/18</a:t>
+              <a:t>27-Nov-18</a:t>
             </a:fld>
             <a:endParaRPr lang="en-US"/>
           </a:p>
@@ -2937,7 +2938,7 @@
           <a:p>
             <a:fld id="{04F1D4A2-813C-F741-B481-C92B3A596030}" type="datetimeFigureOut">
               <a:rPr lang="en-US" smtClean="0"/>
-              <a:t>1/15/18</a:t>
+              <a:t>27-Nov-18</a:t>
             </a:fld>
             <a:endParaRPr lang="en-US"/>
           </a:p>
@@ -3352,9 +3353,16 @@
             <p:ph type="ctrTitle"/>
           </p:nvPr>
         </p:nvSpPr>
-        <p:spPr/>
-        <p:txBody>
-          <a:bodyPr/>
+        <p:spPr>
+          <a:xfrm>
+            <a:off x="396240" y="1122363"/>
+            <a:ext cx="11490960" cy="3357358"/>
+          </a:xfrm>
+        </p:spPr>
+        <p:txBody>
+          <a:bodyPr>
+            <a:normAutofit/>
+          </a:bodyPr>
           <a:lstStyle/>
           <a:p>
             <a:pPr algn="l"/>
@@ -3368,18 +3376,25 @@
             </a:r>
             <a:r>
               <a:rPr lang="en-US" dirty="0" smtClean="0"/>
-              <a:t> 1</a:t>
+              <a:t> </a:t>
+            </a:r>
+            <a:r>
+              <a:rPr lang="en-US" dirty="0" smtClean="0"/>
+              <a:t>1</a:t>
             </a:r>
             <a:br>
               <a:rPr lang="en-US" dirty="0" smtClean="0"/>
             </a:br>
             <a:r>
               <a:rPr lang="en-US" dirty="0" smtClean="0"/>
-              <a:t>Lesson </a:t>
-            </a:r>
-            <a:r>
-              <a:rPr lang="en-US" dirty="0" smtClean="0"/>
-              <a:t>04: EJB</a:t>
+              <a:t/>
+            </a:r>
+            <a:br>
+              <a:rPr lang="en-US" dirty="0" smtClean="0"/>
+            </a:br>
+            <a:r>
+              <a:rPr lang="en-US" dirty="0" smtClean="0"/>
+              <a:t>Lesson 04: EJB</a:t>
             </a:r>
             <a:endParaRPr lang="en-US" dirty="0"/>
           </a:p>
@@ -3397,13 +3412,13 @@
         </p:nvSpPr>
         <p:spPr>
           <a:xfrm>
-            <a:off x="1524000" y="3920358"/>
+            <a:off x="1569720" y="5277276"/>
             <a:ext cx="9144000" cy="1337441"/>
           </a:xfrm>
         </p:spPr>
         <p:txBody>
           <a:bodyPr>
-            <a:normAutofit fontScale="92500" lnSpcReduction="10000"/>
+            <a:normAutofit/>
           </a:bodyPr>
           <a:lstStyle/>
           <a:p>
@@ -3412,21 +3427,6 @@
               <a:rPr lang="en-US" dirty="0" smtClean="0"/>
               <a:t>Dr. Andrea Arcuri</a:t>
             </a:r>
-          </a:p>
-          <a:p>
-            <a:pPr algn="r"/>
-            <a:r>
-              <a:rPr lang="en-US" dirty="0" smtClean="0"/>
-              <a:t>Westerdals Oslo ACT</a:t>
-            </a:r>
-          </a:p>
-          <a:p>
-            <a:pPr algn="r"/>
-            <a:r>
-              <a:rPr lang="en-US" dirty="0" smtClean="0"/>
-              <a:t>University of Luxembourg</a:t>
-            </a:r>
-            <a:endParaRPr lang="en-US" dirty="0"/>
           </a:p>
         </p:txBody>
       </p:sp>
@@ -3462,6 +3462,163 @@
       </p:grpSpPr>
       <p:sp>
         <p:nvSpPr>
+          <p:cNvPr id="2" name="Title 1"/>
+          <p:cNvSpPr>
+            <a:spLocks noGrp="1"/>
+          </p:cNvSpPr>
+          <p:nvPr>
+            <p:ph type="title"/>
+          </p:nvPr>
+        </p:nvSpPr>
+        <p:spPr/>
+        <p:txBody>
+          <a:bodyPr/>
+          <a:lstStyle/>
+          <a:p>
+            <a:r>
+              <a:rPr lang="en-US" dirty="0" smtClean="0"/>
+              <a:t>Lazy Collections</a:t>
+            </a:r>
+            <a:endParaRPr lang="en-US" dirty="0"/>
+          </a:p>
+        </p:txBody>
+      </p:sp>
+      <p:sp>
+        <p:nvSpPr>
+          <p:cNvPr id="3" name="Content Placeholder 2"/>
+          <p:cNvSpPr>
+            <a:spLocks noGrp="1"/>
+          </p:cNvSpPr>
+          <p:nvPr>
+            <p:ph idx="1"/>
+          </p:nvPr>
+        </p:nvSpPr>
+        <p:spPr>
+          <a:xfrm>
+            <a:off x="318782" y="1825625"/>
+            <a:ext cx="11601974" cy="4818456"/>
+          </a:xfrm>
+        </p:spPr>
+        <p:txBody>
+          <a:bodyPr>
+            <a:normAutofit lnSpcReduction="10000"/>
+          </a:bodyPr>
+          <a:lstStyle/>
+          <a:p>
+            <a:r>
+              <a:rPr lang="en-US" dirty="0" smtClean="0"/>
+              <a:t>Collections declared with </a:t>
+            </a:r>
+            <a:r>
+              <a:rPr lang="en-US" i="1" dirty="0" smtClean="0"/>
+              <a:t>@</a:t>
+            </a:r>
+            <a:r>
+              <a:rPr lang="en-US" i="1" dirty="0" err="1" smtClean="0"/>
+              <a:t>OneToMany</a:t>
+            </a:r>
+            <a:r>
+              <a:rPr lang="en-US" dirty="0" smtClean="0"/>
+              <a:t> and </a:t>
+            </a:r>
+            <a:r>
+              <a:rPr lang="en-US" i="1" dirty="0" smtClean="0"/>
+              <a:t>@</a:t>
+            </a:r>
+            <a:r>
+              <a:rPr lang="en-US" i="1" dirty="0" err="1" smtClean="0"/>
+              <a:t>ManyToMany</a:t>
+            </a:r>
+            <a:r>
+              <a:rPr lang="en-US" i="1" dirty="0" smtClean="0"/>
+              <a:t> </a:t>
+            </a:r>
+            <a:r>
+              <a:rPr lang="en-US" dirty="0" smtClean="0"/>
+              <a:t>are not loaded by default </a:t>
+            </a:r>
+          </a:p>
+          <a:p>
+            <a:r>
+              <a:rPr lang="en-US" dirty="0" smtClean="0"/>
+              <a:t>They are loaded only when accessed (</a:t>
+            </a:r>
+            <a:r>
+              <a:rPr lang="en-US" dirty="0" err="1" smtClean="0"/>
+              <a:t>ie</a:t>
+            </a:r>
+            <a:r>
+              <a:rPr lang="en-US" dirty="0" smtClean="0"/>
+              <a:t>, </a:t>
+            </a:r>
+            <a:r>
+              <a:rPr lang="en-US" i="1" dirty="0" smtClean="0"/>
+              <a:t>lazy</a:t>
+            </a:r>
+            <a:r>
+              <a:rPr lang="en-US" dirty="0" smtClean="0"/>
+              <a:t> loading)</a:t>
+            </a:r>
+          </a:p>
+          <a:p>
+            <a:r>
+              <a:rPr lang="en-US" dirty="0" smtClean="0"/>
+              <a:t>But you need to access them inside a transaction</a:t>
+            </a:r>
+          </a:p>
+          <a:p>
+            <a:r>
+              <a:rPr lang="en-US" dirty="0" smtClean="0"/>
+              <a:t>If you try to access them outside, you will get an error</a:t>
+            </a:r>
+          </a:p>
+          <a:p>
+            <a:r>
+              <a:rPr lang="en-US" dirty="0" smtClean="0"/>
+              <a:t>So, if need such data, need to force loading by accessing them while in a transaction</a:t>
+            </a:r>
+          </a:p>
+          <a:p>
+            <a:r>
+              <a:rPr lang="en-US" dirty="0" smtClean="0"/>
+              <a:t>Note: we will go into details of transaction boundaries later in the course</a:t>
+            </a:r>
+            <a:endParaRPr lang="en-US" dirty="0"/>
+          </a:p>
+        </p:txBody>
+      </p:sp>
+    </p:spTree>
+    <p:extLst>
+      <p:ext uri="{BB962C8B-B14F-4D97-AF65-F5344CB8AC3E}">
+        <p14:creationId xmlns:p14="http://schemas.microsoft.com/office/powerpoint/2010/main" val="569512109"/>
+      </p:ext>
+    </p:extLst>
+  </p:cSld>
+  <p:clrMapOvr>
+    <a:masterClrMapping/>
+  </p:clrMapOvr>
+</p:sld>
+</file>
+
+<file path=ppt/slides/slide11.xml><?xml version="1.0" encoding="utf-8"?>
+<p:sld xmlns:a="http://schemas.openxmlformats.org/drawingml/2006/main" xmlns:r="http://schemas.openxmlformats.org/officeDocument/2006/relationships" xmlns:p="http://schemas.openxmlformats.org/presentationml/2006/main">
+  <p:cSld>
+    <p:spTree>
+      <p:nvGrpSpPr>
+        <p:cNvPr id="1" name=""/>
+        <p:cNvGrpSpPr/>
+        <p:nvPr/>
+      </p:nvGrpSpPr>
+      <p:grpSpPr>
+        <a:xfrm>
+          <a:off x="0" y="0"/>
+          <a:ext cx="0" cy="0"/>
+          <a:chOff x="0" y="0"/>
+          <a:chExt cx="0" cy="0"/>
+        </a:xfrm>
+      </p:grpSpPr>
+      <p:sp>
+        <p:nvSpPr>
           <p:cNvPr id="4" name="Title 3"/>
           <p:cNvSpPr>
             <a:spLocks noGrp="1"/>
@@ -3535,7 +3692,6 @@
               <a:rPr lang="en-US" b="1" dirty="0" smtClean="0"/>
               <a:t>/stateless</a:t>
             </a:r>
-            <a:endParaRPr lang="en-US" b="1" dirty="0" smtClean="0"/>
           </a:p>
           <a:p>
             <a:r>
@@ -3558,7 +3714,6 @@
               <a:rPr lang="en-US" b="1" dirty="0" smtClean="0"/>
               <a:t>/query</a:t>
             </a:r>
-            <a:endParaRPr lang="en-US" dirty="0"/>
           </a:p>
           <a:p>
             <a:r>
@@ -3579,8 +3734,9 @@
             </a:r>
             <a:r>
               <a:rPr lang="en-US" b="1" dirty="0" smtClean="0"/>
-              <a:t>/framework/injection</a:t>
-            </a:r>
+              <a:t>/lazy</a:t>
+            </a:r>
+            <a:endParaRPr lang="en-US" dirty="0"/>
           </a:p>
           <a:p>
             <a:r>
@@ -3601,22 +3757,39 @@
             </a:r>
             <a:r>
               <a:rPr lang="en-US" b="1" dirty="0" smtClean="0"/>
+              <a:t>/framework/injection</a:t>
+            </a:r>
+          </a:p>
+          <a:p>
+            <a:r>
+              <a:rPr lang="en-US" b="1" dirty="0" smtClean="0"/>
+              <a:t>intro/</a:t>
+            </a:r>
+            <a:r>
+              <a:rPr lang="en-US" b="1" dirty="0" err="1" smtClean="0"/>
+              <a:t>jee</a:t>
+            </a:r>
+            <a:r>
+              <a:rPr lang="en-US" b="1" dirty="0" smtClean="0"/>
+              <a:t>/</a:t>
+            </a:r>
+            <a:r>
+              <a:rPr lang="en-US" b="1" dirty="0" err="1" smtClean="0"/>
+              <a:t>ejb</a:t>
+            </a:r>
+            <a:r>
+              <a:rPr lang="en-US" b="1" dirty="0" smtClean="0"/>
               <a:t>/framework/proxy</a:t>
             </a:r>
-            <a:endParaRPr lang="en-US" dirty="0"/>
-          </a:p>
-          <a:p>
-            <a:r>
-              <a:rPr lang="en-US" dirty="0" smtClean="0"/>
-              <a:t>Exercises for Lesson </a:t>
-            </a:r>
-            <a:r>
-              <a:rPr lang="en-US" dirty="0" smtClean="0"/>
-              <a:t>04 </a:t>
-            </a:r>
-            <a:r>
-              <a:rPr lang="en-US" dirty="0" smtClean="0"/>
-              <a:t>(see documentation)</a:t>
+          </a:p>
+          <a:p>
+            <a:r>
+              <a:rPr lang="en-US" dirty="0" smtClean="0"/>
+              <a:t>Exercises </a:t>
+            </a:r>
+            <a:r>
+              <a:rPr lang="en-US" dirty="0" smtClean="0"/>
+              <a:t>for Lesson 04 (see documentation)</a:t>
             </a:r>
             <a:endParaRPr lang="en-US" dirty="0"/>
           </a:p>
@@ -3830,7 +4003,7 @@
             </a:r>
             <a:r>
               <a:rPr lang="en-US" dirty="0" err="1" smtClean="0"/>
-              <a:t>Wildfly</a:t>
+              <a:t>WildFly</a:t>
             </a:r>
             <a:r>
               <a:rPr lang="en-US" dirty="0" smtClean="0"/>
@@ -3978,26 +4151,35 @@
         </p:nvSpPr>
         <p:spPr>
           <a:xfrm>
-            <a:off x="838200" y="1825624"/>
-            <a:ext cx="10515600" cy="4783405"/>
+            <a:off x="251670" y="1825624"/>
+            <a:ext cx="11102130" cy="4783405"/>
           </a:xfrm>
         </p:spPr>
         <p:txBody>
           <a:bodyPr>
-            <a:normAutofit lnSpcReduction="10000"/>
+            <a:normAutofit/>
           </a:bodyPr>
           <a:lstStyle/>
           <a:p>
             <a:r>
               <a:rPr lang="en-US" dirty="0" smtClean="0"/>
-              <a:t>Java EE EJB enhancements are based on 2 main properties</a:t>
-            </a:r>
-          </a:p>
-          <a:p>
-            <a:r>
-              <a:rPr lang="en-US" dirty="0" smtClean="0"/>
-              <a:t>Those are not only for Java EE</a:t>
-            </a:r>
+              <a:t>JEE </a:t>
+            </a:r>
+            <a:r>
+              <a:rPr lang="en-US" dirty="0" smtClean="0"/>
+              <a:t>EJB enhancements are based on 2 main properties</a:t>
+            </a:r>
+          </a:p>
+          <a:p>
+            <a:r>
+              <a:rPr lang="en-US" dirty="0" smtClean="0"/>
+              <a:t>Those are not only for </a:t>
+            </a:r>
+            <a:r>
+              <a:rPr lang="en-US" dirty="0" smtClean="0"/>
+              <a:t>JEE</a:t>
+            </a:r>
+            <a:endParaRPr lang="en-US" dirty="0" smtClean="0"/>
           </a:p>
           <a:p>
             <a:r>
@@ -4117,7 +4299,7 @@
               <a:t>For “</a:t>
             </a:r>
             <a:r>
-              <a:rPr lang="en-US" dirty="0" err="1" smtClean="0"/>
+              <a:rPr lang="en-US" i="1" dirty="0" err="1" smtClean="0"/>
               <a:t>em</a:t>
             </a:r>
             <a:r>
@@ -4128,7 +4310,11 @@
           <a:p>
             <a:r>
               <a:rPr lang="en-US" dirty="0" smtClean="0"/>
-              <a:t>Java EE container will automatically </a:t>
+              <a:t>JEE </a:t>
+            </a:r>
+            <a:r>
+              <a:rPr lang="en-US" dirty="0" smtClean="0"/>
+              <a:t>container will automatically </a:t>
             </a:r>
             <a:r>
               <a:rPr lang="en-US" i="1" dirty="0" smtClean="0"/>
@@ -4139,7 +4325,7 @@
               <a:t> the current active “</a:t>
             </a:r>
             <a:r>
-              <a:rPr lang="en-US" dirty="0" err="1" smtClean="0"/>
+              <a:rPr lang="en-US" i="1" dirty="0" err="1" smtClean="0"/>
               <a:t>em</a:t>
             </a:r>
             <a:r>
@@ -4354,10 +4540,15 @@
             <p:ph idx="1"/>
           </p:nvPr>
         </p:nvSpPr>
-        <p:spPr/>
+        <p:spPr>
+          <a:xfrm>
+            <a:off x="360727" y="1825624"/>
+            <a:ext cx="11484528" cy="4726177"/>
+          </a:xfrm>
+        </p:spPr>
         <p:txBody>
           <a:bodyPr>
-            <a:normAutofit fontScale="92500" lnSpcReduction="10000"/>
+            <a:normAutofit lnSpcReduction="10000"/>
           </a:bodyPr>
           <a:lstStyle/>
           <a:p>
@@ -4462,32 +4653,37 @@
             <p:ph type="title"/>
           </p:nvPr>
         </p:nvSpPr>
-        <p:spPr/>
-        <p:txBody>
-          <a:bodyPr/>
-          <a:lstStyle/>
-          <a:p>
-            <a:r>
-              <a:rPr lang="en-US" dirty="0" smtClean="0"/>
-              <a:t>Proxy Class</a:t>
-            </a:r>
-            <a:endParaRPr lang="en-US" dirty="0"/>
-          </a:p>
-        </p:txBody>
-      </p:sp>
-      <p:sp>
-        <p:nvSpPr>
-          <p:cNvPr id="3" name="Content Placeholder 2"/>
-          <p:cNvSpPr>
-            <a:spLocks noGrp="1"/>
-          </p:cNvSpPr>
-          <p:nvPr>
-            <p:ph idx="1"/>
-          </p:nvPr>
-        </p:nvSpPr>
         <p:spPr>
           <a:xfrm>
-            <a:off x="512275" y="1690688"/>
+            <a:off x="838200" y="69272"/>
+            <a:ext cx="10515600" cy="1325563"/>
+          </a:xfrm>
+        </p:spPr>
+        <p:txBody>
+          <a:bodyPr/>
+          <a:lstStyle/>
+          <a:p>
+            <a:r>
+              <a:rPr lang="en-US" dirty="0" smtClean="0"/>
+              <a:t>Proxy Class</a:t>
+            </a:r>
+            <a:endParaRPr lang="en-US" dirty="0"/>
+          </a:p>
+        </p:txBody>
+      </p:sp>
+      <p:sp>
+        <p:nvSpPr>
+          <p:cNvPr id="3" name="Content Placeholder 2"/>
+          <p:cNvSpPr>
+            <a:spLocks noGrp="1"/>
+          </p:cNvSpPr>
+          <p:nvPr>
+            <p:ph idx="1"/>
+          </p:nvPr>
+        </p:nvSpPr>
+        <p:spPr>
+          <a:xfrm>
+            <a:off x="512275" y="1321871"/>
             <a:ext cx="10515600" cy="528276"/>
           </a:xfrm>
         </p:spPr>
@@ -4513,8 +4709,8 @@
         </p:nvSpPr>
         <p:spPr>
           <a:xfrm>
-            <a:off x="679010" y="2833735"/>
-            <a:ext cx="3105787" cy="2031325"/>
+            <a:off x="142115" y="2620523"/>
+            <a:ext cx="4725653" cy="3108543"/>
           </a:xfrm>
           <a:prstGeom prst="rect">
             <a:avLst/>
@@ -4528,76 +4724,76 @@
           <a:lstStyle/>
           <a:p>
             <a:r>
-              <a:rPr lang="en-US" b="1" dirty="0"/>
+              <a:rPr lang="en-US" sz="2800" b="1" dirty="0"/>
               <a:t>public class </a:t>
             </a:r>
             <a:r>
-              <a:rPr lang="en-US" dirty="0"/>
+              <a:rPr lang="en-US" sz="2800" dirty="0"/>
               <a:t>Foo {</a:t>
             </a:r>
             <a:br>
-              <a:rPr lang="en-US" dirty="0"/>
+              <a:rPr lang="en-US" sz="2800" dirty="0"/>
             </a:br>
             <a:r>
-              <a:rPr lang="en-US" dirty="0"/>
+              <a:rPr lang="en-US" sz="2800" dirty="0"/>
               <a:t/>
             </a:r>
             <a:br>
-              <a:rPr lang="en-US" dirty="0"/>
+              <a:rPr lang="en-US" sz="2800" dirty="0"/>
             </a:br>
             <a:r>
-              <a:rPr lang="en-US" dirty="0"/>
+              <a:rPr lang="en-US" sz="2800" dirty="0"/>
               <a:t>    </a:t>
             </a:r>
             <a:r>
-              <a:rPr lang="en-US" b="1" dirty="0"/>
+              <a:rPr lang="en-US" sz="2800" b="1" dirty="0"/>
               <a:t>public </a:t>
             </a:r>
             <a:r>
-              <a:rPr lang="en-US" dirty="0"/>
+              <a:rPr lang="en-US" sz="2800" dirty="0"/>
               <a:t>String </a:t>
             </a:r>
             <a:r>
-              <a:rPr lang="en-US" dirty="0" err="1"/>
+              <a:rPr lang="en-US" sz="2800" dirty="0" err="1"/>
               <a:t>someMethod</a:t>
             </a:r>
             <a:r>
-              <a:rPr lang="en-US" dirty="0"/>
+              <a:rPr lang="en-US" sz="2800" dirty="0"/>
               <a:t>(){</a:t>
             </a:r>
             <a:br>
-              <a:rPr lang="en-US" dirty="0"/>
+              <a:rPr lang="en-US" sz="2800" dirty="0"/>
             </a:br>
             <a:r>
-              <a:rPr lang="en-US" dirty="0"/>
+              <a:rPr lang="en-US" sz="2800" dirty="0"/>
               <a:t>        </a:t>
             </a:r>
             <a:r>
-              <a:rPr lang="en-US" b="1" dirty="0"/>
+              <a:rPr lang="en-US" sz="2800" b="1" dirty="0"/>
               <a:t>return "foo"</a:t>
             </a:r>
             <a:r>
-              <a:rPr lang="en-US" dirty="0"/>
+              <a:rPr lang="en-US" sz="2800" dirty="0"/>
               <a:t>;</a:t>
             </a:r>
             <a:br>
-              <a:rPr lang="en-US" dirty="0"/>
+              <a:rPr lang="en-US" sz="2800" dirty="0"/>
             </a:br>
             <a:r>
-              <a:rPr lang="en-US" dirty="0"/>
+              <a:rPr lang="en-US" sz="2800" dirty="0"/>
               <a:t>    }</a:t>
             </a:r>
             <a:br>
-              <a:rPr lang="en-US" dirty="0"/>
+              <a:rPr lang="en-US" sz="2800" dirty="0"/>
             </a:br>
             <a:r>
-              <a:rPr lang="en-US" dirty="0"/>
+              <a:rPr lang="en-US" sz="2800" dirty="0"/>
               <a:t>}</a:t>
             </a:r>
             <a:br>
-              <a:rPr lang="en-US" dirty="0"/>
+              <a:rPr lang="en-US" sz="2800" dirty="0"/>
             </a:br>
-            <a:endParaRPr lang="en-US" dirty="0"/>
+            <a:endParaRPr lang="en-US" sz="2800" dirty="0"/>
           </a:p>
         </p:txBody>
       </p:sp>
@@ -4609,8 +4805,8 @@
         </p:nvSpPr>
         <p:spPr>
           <a:xfrm>
-            <a:off x="5350598" y="2519215"/>
-            <a:ext cx="5278170" cy="4524315"/>
+            <a:off x="5694553" y="2093428"/>
+            <a:ext cx="6201035" cy="5016758"/>
           </a:xfrm>
           <a:prstGeom prst="rect">
             <a:avLst/>
@@ -4624,271 +4820,271 @@
           <a:lstStyle/>
           <a:p>
             <a:r>
-              <a:rPr lang="en-US" b="1" dirty="0"/>
+              <a:rPr lang="en-US" sz="2000" b="1" dirty="0"/>
               <a:t>public class </a:t>
             </a:r>
             <a:r>
-              <a:rPr lang="en-US" dirty="0" err="1"/>
+              <a:rPr lang="en-US" sz="2000" dirty="0" err="1"/>
               <a:t>FooProxy</a:t>
             </a:r>
             <a:r>
-              <a:rPr lang="en-US" dirty="0"/>
+              <a:rPr lang="en-US" sz="2000" dirty="0"/>
               <a:t> </a:t>
             </a:r>
             <a:r>
-              <a:rPr lang="en-US" b="1" dirty="0"/>
+              <a:rPr lang="en-US" sz="2000" b="1" dirty="0"/>
               <a:t>extends </a:t>
             </a:r>
             <a:r>
-              <a:rPr lang="en-US" dirty="0"/>
+              <a:rPr lang="en-US" sz="2000" dirty="0"/>
               <a:t>Foo{</a:t>
             </a:r>
             <a:br>
-              <a:rPr lang="en-US" dirty="0"/>
+              <a:rPr lang="en-US" sz="2000" dirty="0"/>
             </a:br>
             <a:r>
-              <a:rPr lang="en-US" dirty="0" smtClean="0"/>
+              <a:rPr lang="en-US" sz="2000" dirty="0" smtClean="0"/>
               <a:t>    </a:t>
             </a:r>
             <a:r>
-              <a:rPr lang="en-US" b="1" dirty="0"/>
+              <a:rPr lang="en-US" sz="2000" b="1" dirty="0"/>
               <a:t>private final </a:t>
             </a:r>
             <a:r>
-              <a:rPr lang="en-US" dirty="0"/>
+              <a:rPr lang="en-US" sz="2000" dirty="0"/>
               <a:t>Foo </a:t>
             </a:r>
             <a:r>
-              <a:rPr lang="en-US" b="1" dirty="0"/>
+              <a:rPr lang="en-US" sz="2000" b="1" dirty="0"/>
               <a:t>original</a:t>
             </a:r>
             <a:r>
-              <a:rPr lang="en-US" dirty="0"/>
+              <a:rPr lang="en-US" sz="2000" dirty="0"/>
               <a:t>;</a:t>
             </a:r>
             <a:br>
-              <a:rPr lang="en-US" dirty="0"/>
+              <a:rPr lang="en-US" sz="2000" dirty="0"/>
             </a:br>
             <a:r>
-              <a:rPr lang="en-US" dirty="0"/>
+              <a:rPr lang="en-US" sz="2000" dirty="0"/>
               <a:t/>
             </a:r>
             <a:br>
-              <a:rPr lang="en-US" dirty="0"/>
+              <a:rPr lang="en-US" sz="2000" dirty="0"/>
             </a:br>
             <a:r>
-              <a:rPr lang="en-US" dirty="0"/>
+              <a:rPr lang="en-US" sz="2000" dirty="0"/>
               <a:t>    </a:t>
             </a:r>
             <a:r>
-              <a:rPr lang="en-US" b="1" dirty="0"/>
+              <a:rPr lang="en-US" sz="2000" b="1" dirty="0"/>
               <a:t>public </a:t>
             </a:r>
             <a:r>
-              <a:rPr lang="en-US" dirty="0" err="1"/>
+              <a:rPr lang="en-US" sz="2000" dirty="0" err="1"/>
               <a:t>FooProxy</a:t>
             </a:r>
             <a:r>
-              <a:rPr lang="en-US" dirty="0"/>
+              <a:rPr lang="en-US" sz="2000" dirty="0"/>
               <a:t>(Foo original) {</a:t>
             </a:r>
             <a:br>
-              <a:rPr lang="en-US" dirty="0"/>
+              <a:rPr lang="en-US" sz="2000" dirty="0"/>
             </a:br>
             <a:r>
-              <a:rPr lang="en-US" dirty="0"/>
+              <a:rPr lang="en-US" sz="2000" dirty="0"/>
               <a:t>        </a:t>
             </a:r>
             <a:r>
-              <a:rPr lang="en-US" b="1" dirty="0" err="1"/>
+              <a:rPr lang="en-US" sz="2000" b="1" dirty="0" err="1"/>
               <a:t>this</a:t>
             </a:r>
             <a:r>
-              <a:rPr lang="en-US" dirty="0" err="1"/>
+              <a:rPr lang="en-US" sz="2000" dirty="0" err="1"/>
               <a:t>.</a:t>
             </a:r>
             <a:r>
-              <a:rPr lang="en-US" b="1" dirty="0" err="1"/>
+              <a:rPr lang="en-US" sz="2000" b="1" dirty="0" err="1"/>
               <a:t>original</a:t>
             </a:r>
             <a:r>
-              <a:rPr lang="en-US" b="1" dirty="0"/>
+              <a:rPr lang="en-US" sz="2000" b="1" dirty="0"/>
               <a:t> </a:t>
             </a:r>
             <a:r>
-              <a:rPr lang="en-US" dirty="0"/>
+              <a:rPr lang="en-US" sz="2000" dirty="0"/>
               <a:t>= original;</a:t>
             </a:r>
             <a:br>
-              <a:rPr lang="en-US" dirty="0"/>
+              <a:rPr lang="en-US" sz="2000" dirty="0"/>
             </a:br>
             <a:r>
-              <a:rPr lang="en-US" dirty="0"/>
+              <a:rPr lang="en-US" sz="2000" dirty="0"/>
               <a:t>    }</a:t>
             </a:r>
             <a:br>
-              <a:rPr lang="en-US" dirty="0"/>
+              <a:rPr lang="en-US" sz="2000" dirty="0"/>
             </a:br>
             <a:r>
-              <a:rPr lang="en-US" dirty="0"/>
+              <a:rPr lang="en-US" sz="2000" dirty="0"/>
               <a:t/>
             </a:r>
             <a:br>
-              <a:rPr lang="en-US" dirty="0"/>
+              <a:rPr lang="en-US" sz="2000" dirty="0"/>
             </a:br>
             <a:r>
-              <a:rPr lang="en-US" dirty="0"/>
+              <a:rPr lang="en-US" sz="2000" dirty="0"/>
               <a:t>    </a:t>
             </a:r>
             <a:r>
-              <a:rPr lang="en-US" b="1" dirty="0"/>
+              <a:rPr lang="en-US" sz="2000" b="1" dirty="0"/>
               <a:t>@Override</a:t>
             </a:r>
             <a:br>
-              <a:rPr lang="en-US" b="1" dirty="0"/>
+              <a:rPr lang="en-US" sz="2000" b="1" dirty="0"/>
             </a:br>
             <a:r>
-              <a:rPr lang="en-US" b="1" dirty="0"/>
+              <a:rPr lang="en-US" sz="2000" b="1" dirty="0"/>
               <a:t>    public </a:t>
             </a:r>
             <a:r>
-              <a:rPr lang="en-US" dirty="0"/>
+              <a:rPr lang="en-US" sz="2000" dirty="0"/>
               <a:t>String </a:t>
             </a:r>
             <a:r>
-              <a:rPr lang="en-US" dirty="0" err="1"/>
+              <a:rPr lang="en-US" sz="2000" dirty="0" err="1"/>
               <a:t>someMethod</a:t>
             </a:r>
             <a:r>
-              <a:rPr lang="en-US" dirty="0" smtClean="0"/>
+              <a:rPr lang="en-US" sz="2000" dirty="0" smtClean="0"/>
               <a:t>(){</a:t>
             </a:r>
             <a:r>
-              <a:rPr lang="en-US" dirty="0"/>
+              <a:rPr lang="en-US" sz="2000" dirty="0"/>
               <a:t/>
             </a:r>
             <a:br>
-              <a:rPr lang="en-US" dirty="0"/>
+              <a:rPr lang="en-US" sz="2000" dirty="0"/>
             </a:br>
             <a:r>
-              <a:rPr lang="en-US" dirty="0"/>
+              <a:rPr lang="en-US" sz="2000" dirty="0"/>
               <a:t>        </a:t>
             </a:r>
             <a:r>
-              <a:rPr lang="en-US" i="1" dirty="0"/>
+              <a:rPr lang="en-US" sz="2000" i="1" dirty="0"/>
               <a:t>// do something </a:t>
             </a:r>
             <a:r>
-              <a:rPr lang="en-US" i="1" dirty="0" smtClean="0"/>
+              <a:rPr lang="en-US" sz="2000" i="1" dirty="0" smtClean="0"/>
               <a:t>before, </a:t>
             </a:r>
             <a:r>
-              <a:rPr lang="en-US" i="1" dirty="0" err="1" smtClean="0"/>
+              <a:rPr lang="en-US" sz="2000" i="1" dirty="0" err="1" smtClean="0"/>
               <a:t>eg</a:t>
             </a:r>
             <a:r>
-              <a:rPr lang="en-US" i="1" dirty="0" smtClean="0"/>
+              <a:rPr lang="en-US" sz="2000" i="1" dirty="0" smtClean="0"/>
               <a:t> </a:t>
             </a:r>
             <a:r>
-              <a:rPr lang="en-US" i="1" dirty="0"/>
+              <a:rPr lang="en-US" sz="2000" i="1" dirty="0"/>
               <a:t>start a </a:t>
             </a:r>
             <a:r>
-              <a:rPr lang="en-US" i="1" dirty="0" smtClean="0"/>
+              <a:rPr lang="en-US" sz="2000" i="1" dirty="0" smtClean="0"/>
               <a:t>transaction</a:t>
             </a:r>
             <a:r>
-              <a:rPr lang="en-US" i="1" dirty="0"/>
+              <a:rPr lang="en-US" sz="2000" i="1" dirty="0"/>
               <a:t/>
             </a:r>
             <a:br>
-              <a:rPr lang="en-US" i="1" dirty="0"/>
+              <a:rPr lang="en-US" sz="2000" i="1" dirty="0"/>
             </a:br>
             <a:r>
-              <a:rPr lang="en-US" i="1" dirty="0"/>
+              <a:rPr lang="en-US" sz="2000" i="1" dirty="0"/>
               <a:t>        </a:t>
             </a:r>
             <a:r>
-              <a:rPr lang="en-US" dirty="0"/>
+              <a:rPr lang="en-US" sz="2000" dirty="0"/>
               <a:t>String result = </a:t>
             </a:r>
             <a:r>
-              <a:rPr lang="en-US" b="1" dirty="0" err="1"/>
+              <a:rPr lang="en-US" sz="2000" b="1" dirty="0" err="1"/>
               <a:t>original</a:t>
             </a:r>
             <a:r>
-              <a:rPr lang="en-US" dirty="0" err="1"/>
+              <a:rPr lang="en-US" sz="2000" dirty="0" err="1"/>
               <a:t>.someMethod</a:t>
             </a:r>
             <a:r>
-              <a:rPr lang="en-US" dirty="0" smtClean="0"/>
+              <a:rPr lang="en-US" sz="2000" dirty="0" smtClean="0"/>
               <a:t>();</a:t>
             </a:r>
             <a:r>
-              <a:rPr lang="en-US" dirty="0"/>
+              <a:rPr lang="en-US" sz="2000" dirty="0"/>
               <a:t/>
             </a:r>
             <a:br>
-              <a:rPr lang="en-US" dirty="0"/>
+              <a:rPr lang="en-US" sz="2000" dirty="0"/>
             </a:br>
             <a:r>
-              <a:rPr lang="en-US" dirty="0"/>
+              <a:rPr lang="en-US" sz="2000" dirty="0"/>
               <a:t>     </a:t>
             </a:r>
             <a:r>
-              <a:rPr lang="en-US" dirty="0" smtClean="0"/>
+              <a:rPr lang="en-US" sz="2000" dirty="0" smtClean="0"/>
               <a:t>   </a:t>
             </a:r>
             <a:r>
-              <a:rPr lang="en-US" i="1" dirty="0"/>
+              <a:rPr lang="en-US" sz="2000" i="1" dirty="0"/>
               <a:t>//do something </a:t>
             </a:r>
             <a:r>
-              <a:rPr lang="en-US" i="1" dirty="0" smtClean="0"/>
+              <a:rPr lang="en-US" sz="2000" i="1" dirty="0" smtClean="0"/>
               <a:t>after, </a:t>
             </a:r>
             <a:r>
-              <a:rPr lang="en-US" i="1" dirty="0" err="1" smtClean="0"/>
+              <a:rPr lang="en-US" sz="2000" i="1" dirty="0" err="1" smtClean="0"/>
               <a:t>eg</a:t>
             </a:r>
             <a:r>
-              <a:rPr lang="en-US" i="1" dirty="0"/>
+              <a:rPr lang="en-US" sz="2000" i="1" dirty="0"/>
               <a:t>, commit the transaction</a:t>
             </a:r>
             <a:br>
-              <a:rPr lang="en-US" i="1" dirty="0"/>
+              <a:rPr lang="en-US" sz="2000" i="1" dirty="0"/>
             </a:br>
             <a:r>
-              <a:rPr lang="en-US" i="1" dirty="0"/>
+              <a:rPr lang="en-US" sz="2000" i="1" dirty="0"/>
               <a:t>        </a:t>
             </a:r>
             <a:r>
-              <a:rPr lang="en-US" b="1" dirty="0"/>
+              <a:rPr lang="en-US" sz="2000" b="1" dirty="0"/>
               <a:t>return </a:t>
             </a:r>
             <a:r>
-              <a:rPr lang="en-US" dirty="0"/>
+              <a:rPr lang="en-US" sz="2000" dirty="0"/>
               <a:t>result;</a:t>
             </a:r>
             <a:br>
-              <a:rPr lang="en-US" dirty="0"/>
+              <a:rPr lang="en-US" sz="2000" dirty="0"/>
             </a:br>
             <a:r>
-              <a:rPr lang="en-US" dirty="0"/>
+              <a:rPr lang="en-US" sz="2000" dirty="0"/>
               <a:t>    }</a:t>
             </a:r>
             <a:br>
-              <a:rPr lang="en-US" dirty="0"/>
+              <a:rPr lang="en-US" sz="2000" dirty="0"/>
             </a:br>
             <a:r>
-              <a:rPr lang="en-US" dirty="0"/>
+              <a:rPr lang="en-US" sz="2000" dirty="0"/>
               <a:t>}</a:t>
             </a:r>
             <a:br>
-              <a:rPr lang="en-US" dirty="0"/>
+              <a:rPr lang="en-US" sz="2000" dirty="0"/>
             </a:br>
-            <a:endParaRPr lang="en-US" dirty="0"/>
+            <a:endParaRPr lang="en-US" sz="2000" dirty="0"/>
           </a:p>
         </p:txBody>
       </p:sp>
@@ -5067,7 +5263,15 @@
           <a:p>
             <a:r>
               <a:rPr lang="en-US" dirty="0" smtClean="0"/>
-              <a:t>For EJB, we need a Java EE container</a:t>
+              <a:t>For EJB, we need a </a:t>
+            </a:r>
+            <a:r>
+              <a:rPr lang="en-US" dirty="0" smtClean="0"/>
+              <a:t>JEE </a:t>
+            </a:r>
+            <a:r>
+              <a:rPr lang="en-US" dirty="0" smtClean="0"/>
+              <a:t>container</a:t>
             </a:r>
           </a:p>
           <a:p>
@@ -5084,7 +5288,15 @@
           <a:p>
             <a:r>
               <a:rPr lang="en-US" dirty="0" smtClean="0"/>
-              <a:t>But embedded Java EE containers are just for testing, and </a:t>
+              <a:t>But embedded </a:t>
+            </a:r>
+            <a:r>
+              <a:rPr lang="en-US" dirty="0" smtClean="0"/>
+              <a:t>JEE </a:t>
+            </a:r>
+            <a:r>
+              <a:rPr lang="en-US" dirty="0" smtClean="0"/>
+              <a:t>containers are just for testing, and </a:t>
             </a:r>
             <a:r>
               <a:rPr lang="en-US" i="1" dirty="0" smtClean="0"/>
@@ -5155,7 +5367,7 @@
               <a:t>Note: life will get easier once we start with </a:t>
             </a:r>
             <a:r>
-              <a:rPr lang="en-US" dirty="0" err="1" smtClean="0"/>
+              <a:rPr lang="en-US" i="1" dirty="0" err="1" smtClean="0"/>
               <a:t>SpringBoot</a:t>
             </a:r>
             <a:r>

</xml_diff>

<commit_message>
updating les 04 and 05
</commit_message>
<xml_diff>
--- a/doc/intro/slides/lesson_04_ejb.pptx
+++ b/doc/intro/slides/lesson_04_ejb.pptx
@@ -5,7 +5,7 @@
     <p:sldMasterId id="2147483648" r:id="rId1"/>
   </p:sldMasterIdLst>
   <p:notesMasterIdLst>
-    <p:notesMasterId r:id="rId13"/>
+    <p:notesMasterId r:id="rId17"/>
   </p:notesMasterIdLst>
   <p:sldIdLst>
     <p:sldId id="256" r:id="rId2"/>
@@ -16,9 +16,13 @@
     <p:sldId id="279" r:id="rId7"/>
     <p:sldId id="280" r:id="rId8"/>
     <p:sldId id="281" r:id="rId9"/>
-    <p:sldId id="282" r:id="rId10"/>
-    <p:sldId id="283" r:id="rId11"/>
-    <p:sldId id="271" r:id="rId12"/>
+    <p:sldId id="283" r:id="rId10"/>
+    <p:sldId id="284" r:id="rId11"/>
+    <p:sldId id="285" r:id="rId12"/>
+    <p:sldId id="286" r:id="rId13"/>
+    <p:sldId id="287" r:id="rId14"/>
+    <p:sldId id="288" r:id="rId15"/>
+    <p:sldId id="271" r:id="rId16"/>
   </p:sldIdLst>
   <p:sldSz cx="12192000" cy="6858000"/>
   <p:notesSz cx="6858000" cy="9144000"/>
@@ -207,7 +211,7 @@
           <a:p>
             <a:fld id="{9B5B52BA-3295-0343-9E28-A260A811DD10}" type="datetimeFigureOut">
               <a:rPr lang="en-US" smtClean="0"/>
-              <a:t>12/26/18</a:t>
+              <a:t>18-Dec-19</a:t>
             </a:fld>
             <a:endParaRPr lang="en-US"/>
           </a:p>
@@ -475,6 +479,90 @@
 </p:notesMaster>
 </file>
 
+<file path=ppt/notesSlides/notesSlide1.xml><?xml version="1.0" encoding="utf-8"?>
+<p:notes xmlns:a="http://schemas.openxmlformats.org/drawingml/2006/main" xmlns:r="http://schemas.openxmlformats.org/officeDocument/2006/relationships" xmlns:p="http://schemas.openxmlformats.org/presentationml/2006/main">
+  <p:cSld>
+    <p:spTree>
+      <p:nvGrpSpPr>
+        <p:cNvPr id="1" name=""/>
+        <p:cNvGrpSpPr/>
+        <p:nvPr/>
+      </p:nvGrpSpPr>
+      <p:grpSpPr>
+        <a:xfrm>
+          <a:off x="0" y="0"/>
+          <a:ext cx="0" cy="0"/>
+          <a:chOff x="0" y="0"/>
+          <a:chExt cx="0" cy="0"/>
+        </a:xfrm>
+      </p:grpSpPr>
+      <p:sp>
+        <p:nvSpPr>
+          <p:cNvPr id="2" name="Slide Image Placeholder 1"/>
+          <p:cNvSpPr>
+            <a:spLocks noGrp="1" noRot="1" noChangeAspect="1"/>
+          </p:cNvSpPr>
+          <p:nvPr>
+            <p:ph type="sldImg"/>
+          </p:nvPr>
+        </p:nvSpPr>
+        <p:spPr/>
+      </p:sp>
+      <p:sp>
+        <p:nvSpPr>
+          <p:cNvPr id="3" name="Notes Placeholder 2"/>
+          <p:cNvSpPr>
+            <a:spLocks noGrp="1"/>
+          </p:cNvSpPr>
+          <p:nvPr>
+            <p:ph type="body" idx="1"/>
+          </p:nvPr>
+        </p:nvSpPr>
+        <p:spPr/>
+        <p:txBody>
+          <a:bodyPr/>
+          <a:lstStyle/>
+          <a:p>
+            <a:endParaRPr lang="en-US" dirty="0"/>
+          </a:p>
+        </p:txBody>
+      </p:sp>
+      <p:sp>
+        <p:nvSpPr>
+          <p:cNvPr id="4" name="Slide Number Placeholder 3"/>
+          <p:cNvSpPr>
+            <a:spLocks noGrp="1"/>
+          </p:cNvSpPr>
+          <p:nvPr>
+            <p:ph type="sldNum" sz="quarter" idx="10"/>
+          </p:nvPr>
+        </p:nvSpPr>
+        <p:spPr/>
+        <p:txBody>
+          <a:bodyPr/>
+          <a:lstStyle/>
+          <a:p>
+            <a:fld id="{D6FB5A5B-CC88-B64A-8F56-0DBE0ACA83DE}" type="slidenum">
+              <a:rPr lang="en-US" smtClean="0"/>
+              <a:t>12</a:t>
+            </a:fld>
+            <a:endParaRPr lang="en-US"/>
+          </a:p>
+        </p:txBody>
+      </p:sp>
+    </p:spTree>
+    <p:extLst>
+      <p:ext uri="{BB962C8B-B14F-4D97-AF65-F5344CB8AC3E}">
+        <p14:creationId xmlns:p14="http://schemas.microsoft.com/office/powerpoint/2010/main" val="3828079966"/>
+      </p:ext>
+    </p:extLst>
+  </p:cSld>
+  <p:clrMapOvr>
+    <a:masterClrMapping/>
+  </p:clrMapOvr>
+</p:notes>
+</file>
+
 <file path=ppt/slideLayouts/slideLayout1.xml><?xml version="1.0" encoding="utf-8"?>
 <p:sldLayout xmlns:a="http://schemas.openxmlformats.org/drawingml/2006/main" xmlns:r="http://schemas.openxmlformats.org/officeDocument/2006/relationships" xmlns:p="http://schemas.openxmlformats.org/presentationml/2006/main" type="title" preserve="1">
   <p:cSld name="Title Slide">
@@ -606,7 +694,7 @@
           <a:p>
             <a:fld id="{04F1D4A2-813C-F741-B481-C92B3A596030}" type="datetimeFigureOut">
               <a:rPr lang="en-US" smtClean="0"/>
-              <a:t>12/26/18</a:t>
+              <a:t>18-Dec-19</a:t>
             </a:fld>
             <a:endParaRPr lang="en-US"/>
           </a:p>
@@ -776,7 +864,7 @@
           <a:p>
             <a:fld id="{04F1D4A2-813C-F741-B481-C92B3A596030}" type="datetimeFigureOut">
               <a:rPr lang="en-US" smtClean="0"/>
-              <a:t>12/26/18</a:t>
+              <a:t>18-Dec-19</a:t>
             </a:fld>
             <a:endParaRPr lang="en-US"/>
           </a:p>
@@ -956,7 +1044,7 @@
           <a:p>
             <a:fld id="{04F1D4A2-813C-F741-B481-C92B3A596030}" type="datetimeFigureOut">
               <a:rPr lang="en-US" smtClean="0"/>
-              <a:t>12/26/18</a:t>
+              <a:t>18-Dec-19</a:t>
             </a:fld>
             <a:endParaRPr lang="en-US"/>
           </a:p>
@@ -1137,7 +1225,7 @@
           <a:p>
             <a:fld id="{04F1D4A2-813C-F741-B481-C92B3A596030}" type="datetimeFigureOut">
               <a:rPr lang="en-US" smtClean="0"/>
-              <a:t>12/26/18</a:t>
+              <a:t>18-Dec-19</a:t>
             </a:fld>
             <a:endParaRPr lang="en-US"/>
           </a:p>
@@ -1383,7 +1471,7 @@
           <a:p>
             <a:fld id="{04F1D4A2-813C-F741-B481-C92B3A596030}" type="datetimeFigureOut">
               <a:rPr lang="en-US" smtClean="0"/>
-              <a:t>12/26/18</a:t>
+              <a:t>18-Dec-19</a:t>
             </a:fld>
             <a:endParaRPr lang="en-US"/>
           </a:p>
@@ -1615,7 +1703,7 @@
           <a:p>
             <a:fld id="{04F1D4A2-813C-F741-B481-C92B3A596030}" type="datetimeFigureOut">
               <a:rPr lang="en-US" smtClean="0"/>
-              <a:t>12/26/18</a:t>
+              <a:t>18-Dec-19</a:t>
             </a:fld>
             <a:endParaRPr lang="en-US"/>
           </a:p>
@@ -1982,7 +2070,7 @@
           <a:p>
             <a:fld id="{04F1D4A2-813C-F741-B481-C92B3A596030}" type="datetimeFigureOut">
               <a:rPr lang="en-US" smtClean="0"/>
-              <a:t>12/26/18</a:t>
+              <a:t>18-Dec-19</a:t>
             </a:fld>
             <a:endParaRPr lang="en-US"/>
           </a:p>
@@ -2100,7 +2188,7 @@
           <a:p>
             <a:fld id="{04F1D4A2-813C-F741-B481-C92B3A596030}" type="datetimeFigureOut">
               <a:rPr lang="en-US" smtClean="0"/>
-              <a:t>12/26/18</a:t>
+              <a:t>18-Dec-19</a:t>
             </a:fld>
             <a:endParaRPr lang="en-US"/>
           </a:p>
@@ -2195,7 +2283,7 @@
           <a:p>
             <a:fld id="{04F1D4A2-813C-F741-B481-C92B3A596030}" type="datetimeFigureOut">
               <a:rPr lang="en-US" smtClean="0"/>
-              <a:t>12/26/18</a:t>
+              <a:t>18-Dec-19</a:t>
             </a:fld>
             <a:endParaRPr lang="en-US"/>
           </a:p>
@@ -2472,7 +2560,7 @@
           <a:p>
             <a:fld id="{04F1D4A2-813C-F741-B481-C92B3A596030}" type="datetimeFigureOut">
               <a:rPr lang="en-US" smtClean="0"/>
-              <a:t>12/26/18</a:t>
+              <a:t>18-Dec-19</a:t>
             </a:fld>
             <a:endParaRPr lang="en-US"/>
           </a:p>
@@ -2725,7 +2813,7 @@
           <a:p>
             <a:fld id="{04F1D4A2-813C-F741-B481-C92B3A596030}" type="datetimeFigureOut">
               <a:rPr lang="en-US" smtClean="0"/>
-              <a:t>12/26/18</a:t>
+              <a:t>18-Dec-19</a:t>
             </a:fld>
             <a:endParaRPr lang="en-US"/>
           </a:p>
@@ -2938,7 +3026,7 @@
           <a:p>
             <a:fld id="{04F1D4A2-813C-F741-B481-C92B3A596030}" type="datetimeFigureOut">
               <a:rPr lang="en-US" smtClean="0"/>
-              <a:t>12/26/18</a:t>
+              <a:t>18-Dec-19</a:t>
             </a:fld>
             <a:endParaRPr lang="en-US"/>
           </a:p>
@@ -3421,11 +3509,7 @@
             <a:pPr algn="r"/>
             <a:r>
               <a:rPr lang="en-US" smtClean="0"/>
-              <a:t>Prof</a:t>
-            </a:r>
-            <a:r>
-              <a:rPr lang="en-US" smtClean="0"/>
-              <a:t>. </a:t>
+              <a:t>Prof. </a:t>
             </a:r>
             <a:r>
               <a:rPr lang="en-US" dirty="0" smtClean="0"/>
@@ -3481,7 +3565,7 @@
           <a:p>
             <a:r>
               <a:rPr lang="en-US" dirty="0" smtClean="0"/>
-              <a:t>Lazy Collections</a:t>
+              <a:t>Container Deployment	</a:t>
             </a:r>
             <a:endParaRPr lang="en-US" dirty="0"/>
           </a:p>
@@ -3499,93 +3583,86 @@
         </p:nvSpPr>
         <p:spPr>
           <a:xfrm>
-            <a:off x="318782" y="1825625"/>
-            <a:ext cx="11601974" cy="4818456"/>
+            <a:off x="258184" y="1825624"/>
+            <a:ext cx="11736592" cy="4940936"/>
           </a:xfrm>
         </p:spPr>
         <p:txBody>
-          <a:bodyPr>
-            <a:normAutofit lnSpcReduction="10000"/>
-          </a:bodyPr>
-          <a:lstStyle/>
-          <a:p>
-            <a:r>
-              <a:rPr lang="en-US" dirty="0" smtClean="0"/>
-              <a:t>Collections declared with </a:t>
+          <a:bodyPr/>
+          <a:lstStyle/>
+          <a:p>
+            <a:r>
+              <a:rPr lang="en-US" dirty="0" smtClean="0"/>
+              <a:t>To use EJBs, we need to run them in a JEE Container</a:t>
+            </a:r>
+          </a:p>
+          <a:p>
+            <a:pPr lvl="1"/>
+            <a:r>
+              <a:rPr lang="en-US" i="1" dirty="0" err="1" smtClean="0"/>
+              <a:t>WildFly</a:t>
             </a:r>
             <a:r>
               <a:rPr lang="en-US" i="1" dirty="0" smtClean="0"/>
-              <a:t>@</a:t>
+              <a:t>, </a:t>
             </a:r>
             <a:r>
               <a:rPr lang="en-US" i="1" dirty="0" err="1" smtClean="0"/>
-              <a:t>OneToMany</a:t>
+              <a:t>GlassFish</a:t>
+            </a:r>
+            <a:r>
+              <a:rPr lang="en-US" i="1" dirty="0" smtClean="0"/>
+              <a:t>, </a:t>
+            </a:r>
+            <a:r>
+              <a:rPr lang="en-US" i="1" dirty="0" err="1" smtClean="0"/>
+              <a:t>Payara</a:t>
+            </a:r>
+            <a:r>
+              <a:rPr lang="en-US" dirty="0" smtClean="0"/>
+              <a:t>, etc.</a:t>
+            </a:r>
+          </a:p>
+          <a:p>
+            <a:r>
+              <a:rPr lang="en-US" dirty="0" smtClean="0"/>
+              <a:t>We would need to package the JAR/WAR with our code, install it on a running container</a:t>
+            </a:r>
+          </a:p>
+          <a:p>
+            <a:r>
+              <a:rPr lang="en-US" dirty="0" smtClean="0"/>
+              <a:t>But before that, we would need to </a:t>
+            </a:r>
+            <a:r>
+              <a:rPr lang="en-US" b="1" dirty="0" smtClean="0"/>
+              <a:t>download</a:t>
+            </a:r>
+            <a:r>
+              <a:rPr lang="en-US" dirty="0" smtClean="0"/>
+              <a:t>, </a:t>
+            </a:r>
+            <a:r>
+              <a:rPr lang="en-US" b="1" dirty="0" smtClean="0"/>
+              <a:t>install</a:t>
             </a:r>
             <a:r>
               <a:rPr lang="en-US" dirty="0" smtClean="0"/>
               <a:t> and </a:t>
             </a:r>
             <a:r>
-              <a:rPr lang="en-US" i="1" dirty="0" smtClean="0"/>
-              <a:t>@</a:t>
-            </a:r>
-            <a:r>
-              <a:rPr lang="en-US" i="1" dirty="0" err="1" smtClean="0"/>
-              <a:t>ManyToMany</a:t>
-            </a:r>
-            <a:r>
-              <a:rPr lang="en-US" i="1" dirty="0" smtClean="0"/>
-              <a:t> </a:t>
-            </a:r>
-            <a:r>
-              <a:rPr lang="en-US" dirty="0" smtClean="0"/>
-              <a:t>are not loaded by default </a:t>
-            </a:r>
-          </a:p>
-          <a:p>
-            <a:r>
-              <a:rPr lang="en-US" dirty="0" smtClean="0"/>
-              <a:t>They are loaded only when accessed (</a:t>
-            </a:r>
-            <a:r>
-              <a:rPr lang="en-US" dirty="0" err="1" smtClean="0"/>
-              <a:t>ie</a:t>
-            </a:r>
-            <a:r>
-              <a:rPr lang="en-US" dirty="0" smtClean="0"/>
-              <a:t>, </a:t>
-            </a:r>
-            <a:r>
-              <a:rPr lang="en-US" i="1" dirty="0" smtClean="0"/>
-              <a:t>lazy</a:t>
-            </a:r>
-            <a:r>
-              <a:rPr lang="en-US" dirty="0" smtClean="0"/>
-              <a:t> loading)</a:t>
-            </a:r>
-          </a:p>
-          <a:p>
-            <a:r>
-              <a:rPr lang="en-US" dirty="0" smtClean="0"/>
-              <a:t>But you need to access them inside a transaction</a:t>
-            </a:r>
-          </a:p>
-          <a:p>
-            <a:r>
-              <a:rPr lang="en-US" dirty="0" smtClean="0"/>
-              <a:t>If you try to access them outside, you will get an error</a:t>
-            </a:r>
-          </a:p>
-          <a:p>
-            <a:r>
-              <a:rPr lang="en-US" dirty="0" smtClean="0"/>
-              <a:t>So, if need such data, need to force loading by accessing them while in a transaction</a:t>
-            </a:r>
-          </a:p>
-          <a:p>
-            <a:r>
-              <a:rPr lang="en-US" dirty="0" smtClean="0"/>
-              <a:t>Note: we will go into details of transaction boundaries later in the course</a:t>
+              <a:rPr lang="en-US" b="1" dirty="0" smtClean="0"/>
+              <a:t>start</a:t>
+            </a:r>
+            <a:r>
+              <a:rPr lang="en-US" dirty="0" smtClean="0"/>
+              <a:t> a container</a:t>
+            </a:r>
+          </a:p>
+          <a:p>
+            <a:r>
+              <a:rPr lang="en-US" dirty="0" smtClean="0"/>
+              <a:t>But how to test the methods of EJBs directly from a JUnit test?</a:t>
             </a:r>
             <a:endParaRPr lang="en-US" dirty="0"/>
           </a:p>
@@ -3594,7 +3671,7 @@
     </p:spTree>
     <p:extLst>
       <p:ext uri="{BB962C8B-B14F-4D97-AF65-F5344CB8AC3E}">
-        <p14:creationId xmlns:p14="http://schemas.microsoft.com/office/powerpoint/2010/main" val="569512109"/>
+        <p14:creationId xmlns:p14="http://schemas.microsoft.com/office/powerpoint/2010/main" val="3688398089"/>
       </p:ext>
     </p:extLst>
   </p:cSld>
@@ -3605,6 +3682,717 @@
 </file>
 
 <file path=ppt/slides/slide11.xml><?xml version="1.0" encoding="utf-8"?>
+<p:sld xmlns:a="http://schemas.openxmlformats.org/drawingml/2006/main" xmlns:r="http://schemas.openxmlformats.org/officeDocument/2006/relationships" xmlns:p="http://schemas.openxmlformats.org/presentationml/2006/main">
+  <p:cSld>
+    <p:spTree>
+      <p:nvGrpSpPr>
+        <p:cNvPr id="1" name=""/>
+        <p:cNvGrpSpPr/>
+        <p:nvPr/>
+      </p:nvGrpSpPr>
+      <p:grpSpPr>
+        <a:xfrm>
+          <a:off x="0" y="0"/>
+          <a:ext cx="0" cy="0"/>
+          <a:chOff x="0" y="0"/>
+          <a:chExt cx="0" cy="0"/>
+        </a:xfrm>
+      </p:grpSpPr>
+      <p:sp>
+        <p:nvSpPr>
+          <p:cNvPr id="2" name="Title 1"/>
+          <p:cNvSpPr>
+            <a:spLocks noGrp="1"/>
+          </p:cNvSpPr>
+          <p:nvPr>
+            <p:ph type="title"/>
+          </p:nvPr>
+        </p:nvSpPr>
+        <p:spPr/>
+        <p:txBody>
+          <a:bodyPr/>
+          <a:lstStyle/>
+          <a:p>
+            <a:r>
+              <a:rPr lang="en-US" dirty="0" err="1" smtClean="0"/>
+              <a:t>Arquillian</a:t>
+            </a:r>
+            <a:r>
+              <a:rPr lang="en-US" dirty="0" smtClean="0"/>
+              <a:t>	</a:t>
+            </a:r>
+            <a:endParaRPr lang="en-US" dirty="0"/>
+          </a:p>
+        </p:txBody>
+      </p:sp>
+      <p:sp>
+        <p:nvSpPr>
+          <p:cNvPr id="3" name="Content Placeholder 2"/>
+          <p:cNvSpPr>
+            <a:spLocks noGrp="1"/>
+          </p:cNvSpPr>
+          <p:nvPr>
+            <p:ph idx="1"/>
+          </p:nvPr>
+        </p:nvSpPr>
+        <p:spPr>
+          <a:xfrm>
+            <a:off x="139849" y="1825624"/>
+            <a:ext cx="11919473" cy="5032376"/>
+          </a:xfrm>
+        </p:spPr>
+        <p:txBody>
+          <a:bodyPr>
+            <a:normAutofit lnSpcReduction="10000"/>
+          </a:bodyPr>
+          <a:lstStyle/>
+          <a:p>
+            <a:r>
+              <a:rPr lang="en-US" dirty="0" smtClean="0"/>
+              <a:t>A library extending JUnit that allows you to package JAR/WAR files directly from tests and deploy them on a container</a:t>
+            </a:r>
+          </a:p>
+          <a:p>
+            <a:r>
+              <a:rPr lang="en-US" dirty="0" smtClean="0"/>
+              <a:t>The tests themselves are run in the container, so can use dependency injection </a:t>
+            </a:r>
+            <a:r>
+              <a:rPr lang="en-US" i="1" dirty="0" smtClean="0"/>
+              <a:t>@EJB </a:t>
+            </a:r>
+          </a:p>
+          <a:p>
+            <a:r>
+              <a:rPr lang="en-US" dirty="0" smtClean="0"/>
+              <a:t>Configuration in special resource file called </a:t>
+            </a:r>
+            <a:r>
+              <a:rPr lang="en-US" i="1" dirty="0" err="1" smtClean="0"/>
+              <a:t>arquillian.xml</a:t>
+            </a:r>
+            <a:endParaRPr lang="en-US" dirty="0" smtClean="0"/>
+          </a:p>
+          <a:p>
+            <a:r>
+              <a:rPr lang="en-US" dirty="0" smtClean="0"/>
+              <a:t>Limitations: cannot just right-click in IDE to run tests, need some manual settings first</a:t>
+            </a:r>
+            <a:r>
+              <a:rPr lang="mr-IN" dirty="0" smtClean="0"/>
+              <a:t>…</a:t>
+            </a:r>
+            <a:endParaRPr lang="en-US" dirty="0" smtClean="0"/>
+          </a:p>
+          <a:p>
+            <a:r>
+              <a:rPr lang="mr-IN" dirty="0" smtClean="0"/>
+              <a:t>…</a:t>
+            </a:r>
+            <a:r>
+              <a:rPr lang="en-US" dirty="0" smtClean="0"/>
+              <a:t> plus, you still need to download and install a JEE </a:t>
+            </a:r>
+            <a:r>
+              <a:rPr lang="en-US" dirty="0" smtClean="0"/>
+              <a:t>Container</a:t>
+            </a:r>
+          </a:p>
+          <a:p>
+            <a:r>
+              <a:rPr lang="en-US" dirty="0"/>
+              <a:t>Note: life will get easier once we start with </a:t>
+            </a:r>
+            <a:r>
+              <a:rPr lang="en-US" i="1" dirty="0" err="1"/>
+              <a:t>SpringBoot</a:t>
+            </a:r>
+            <a:r>
+              <a:rPr lang="mr-IN" dirty="0"/>
+              <a:t>…</a:t>
+            </a:r>
+            <a:r>
+              <a:rPr lang="en-US" dirty="0"/>
+              <a:t> </a:t>
+            </a:r>
+            <a:r>
+              <a:rPr lang="en-US" dirty="0" smtClean="0"/>
+              <a:t> </a:t>
+            </a:r>
+            <a:endParaRPr lang="en-US" dirty="0"/>
+          </a:p>
+        </p:txBody>
+      </p:sp>
+    </p:spTree>
+    <p:extLst>
+      <p:ext uri="{BB962C8B-B14F-4D97-AF65-F5344CB8AC3E}">
+        <p14:creationId xmlns:p14="http://schemas.microsoft.com/office/powerpoint/2010/main" val="3862529613"/>
+      </p:ext>
+    </p:extLst>
+  </p:cSld>
+  <p:clrMapOvr>
+    <a:masterClrMapping/>
+  </p:clrMapOvr>
+</p:sld>
+</file>
+
+<file path=ppt/slides/slide12.xml><?xml version="1.0" encoding="utf-8"?>
+<p:sld xmlns:a="http://schemas.openxmlformats.org/drawingml/2006/main" xmlns:r="http://schemas.openxmlformats.org/officeDocument/2006/relationships" xmlns:p="http://schemas.openxmlformats.org/presentationml/2006/main">
+  <p:cSld>
+    <p:spTree>
+      <p:nvGrpSpPr>
+        <p:cNvPr id="1" name=""/>
+        <p:cNvGrpSpPr/>
+        <p:nvPr/>
+      </p:nvGrpSpPr>
+      <p:grpSpPr>
+        <a:xfrm>
+          <a:off x="0" y="0"/>
+          <a:ext cx="0" cy="0"/>
+          <a:chOff x="0" y="0"/>
+          <a:chExt cx="0" cy="0"/>
+        </a:xfrm>
+      </p:grpSpPr>
+      <p:sp>
+        <p:nvSpPr>
+          <p:cNvPr id="2" name="Title 1"/>
+          <p:cNvSpPr>
+            <a:spLocks noGrp="1"/>
+          </p:cNvSpPr>
+          <p:nvPr>
+            <p:ph type="title"/>
+          </p:nvPr>
+        </p:nvSpPr>
+        <p:spPr/>
+        <p:txBody>
+          <a:bodyPr/>
+          <a:lstStyle/>
+          <a:p>
+            <a:r>
+              <a:rPr lang="en-US" dirty="0" smtClean="0"/>
+              <a:t>Test Configuration</a:t>
+            </a:r>
+            <a:endParaRPr lang="en-US" dirty="0"/>
+          </a:p>
+        </p:txBody>
+      </p:sp>
+      <p:sp>
+        <p:nvSpPr>
+          <p:cNvPr id="3" name="Content Placeholder 2"/>
+          <p:cNvSpPr>
+            <a:spLocks noGrp="1"/>
+          </p:cNvSpPr>
+          <p:nvPr>
+            <p:ph idx="1"/>
+          </p:nvPr>
+        </p:nvSpPr>
+        <p:spPr>
+          <a:xfrm>
+            <a:off x="282497" y="1553737"/>
+            <a:ext cx="11671609" cy="1713156"/>
+          </a:xfrm>
+        </p:spPr>
+        <p:txBody>
+          <a:bodyPr>
+            <a:normAutofit fontScale="92500" lnSpcReduction="20000"/>
+          </a:bodyPr>
+          <a:lstStyle/>
+          <a:p>
+            <a:r>
+              <a:rPr lang="en-US" dirty="0" err="1" smtClean="0"/>
+              <a:t>Arquillian</a:t>
+            </a:r>
+            <a:r>
+              <a:rPr lang="en-US" dirty="0" smtClean="0"/>
+              <a:t> “</a:t>
+            </a:r>
+            <a:r>
+              <a:rPr lang="en-US" i="1" dirty="0" err="1" smtClean="0"/>
+              <a:t>WildFly</a:t>
+            </a:r>
+            <a:r>
+              <a:rPr lang="en-US" i="1" dirty="0" smtClean="0"/>
+              <a:t> Managed</a:t>
+            </a:r>
+            <a:r>
+              <a:rPr lang="en-US" dirty="0" smtClean="0"/>
+              <a:t>”</a:t>
+            </a:r>
+          </a:p>
+          <a:p>
+            <a:r>
+              <a:rPr lang="en-US" dirty="0" smtClean="0"/>
+              <a:t>“Working directory” -&gt;  “$MODULE_DIR$”</a:t>
+            </a:r>
+          </a:p>
+          <a:p>
+            <a:pPr lvl="1"/>
+            <a:r>
+              <a:rPr lang="en-US" dirty="0" smtClean="0"/>
+              <a:t>note: recent versions of IntelliJ might use a different name for such variable, </a:t>
+            </a:r>
+            <a:r>
+              <a:rPr lang="en-US" dirty="0" err="1" smtClean="0"/>
+              <a:t>eg</a:t>
+            </a:r>
+            <a:r>
+              <a:rPr lang="en-US" dirty="0"/>
+              <a:t> “$MODULE_WORKING_DIR</a:t>
+            </a:r>
+            <a:r>
+              <a:rPr lang="en-US" dirty="0" smtClean="0"/>
+              <a:t>$”. Just choose the right one from the drop-down list </a:t>
+            </a:r>
+            <a:endParaRPr lang="en-US" dirty="0"/>
+          </a:p>
+        </p:txBody>
+      </p:sp>
+      <p:pic>
+        <p:nvPicPr>
+          <p:cNvPr id="5" name="Picture 4"/>
+          <p:cNvPicPr>
+            <a:picLocks noChangeAspect="1"/>
+          </p:cNvPicPr>
+          <p:nvPr/>
+        </p:nvPicPr>
+        <p:blipFill>
+          <a:blip r:embed="rId3">
+            <a:extLst>
+              <a:ext uri="{28A0092B-C50C-407E-A947-70E740481C1C}">
+                <a14:useLocalDpi xmlns:a14="http://schemas.microsoft.com/office/drawing/2010/main"/>
+              </a:ext>
+            </a:extLst>
+          </a:blip>
+          <a:stretch>
+            <a:fillRect/>
+          </a:stretch>
+        </p:blipFill>
+        <p:spPr>
+          <a:xfrm>
+            <a:off x="130223" y="3270324"/>
+            <a:ext cx="5196495" cy="3431647"/>
+          </a:xfrm>
+          <a:prstGeom prst="rect">
+            <a:avLst/>
+          </a:prstGeom>
+        </p:spPr>
+      </p:pic>
+      <p:pic>
+        <p:nvPicPr>
+          <p:cNvPr id="6" name="Picture 5"/>
+          <p:cNvPicPr>
+            <a:picLocks noChangeAspect="1"/>
+          </p:cNvPicPr>
+          <p:nvPr/>
+        </p:nvPicPr>
+        <p:blipFill>
+          <a:blip r:embed="rId4">
+            <a:extLst>
+              <a:ext uri="{28A0092B-C50C-407E-A947-70E740481C1C}">
+                <a14:useLocalDpi xmlns:a14="http://schemas.microsoft.com/office/drawing/2010/main"/>
+              </a:ext>
+            </a:extLst>
+          </a:blip>
+          <a:stretch>
+            <a:fillRect/>
+          </a:stretch>
+        </p:blipFill>
+        <p:spPr>
+          <a:xfrm>
+            <a:off x="6572921" y="3266893"/>
+            <a:ext cx="5167297" cy="3435078"/>
+          </a:xfrm>
+          <a:prstGeom prst="rect">
+            <a:avLst/>
+          </a:prstGeom>
+        </p:spPr>
+      </p:pic>
+    </p:spTree>
+    <p:extLst>
+      <p:ext uri="{BB962C8B-B14F-4D97-AF65-F5344CB8AC3E}">
+        <p14:creationId xmlns:p14="http://schemas.microsoft.com/office/powerpoint/2010/main" val="677380455"/>
+      </p:ext>
+    </p:extLst>
+  </p:cSld>
+  <p:clrMapOvr>
+    <a:masterClrMapping/>
+  </p:clrMapOvr>
+  <p:timing>
+    <p:tnLst>
+      <p:par>
+        <p:cTn id="1" dur="indefinite" restart="never" nodeType="tmRoot"/>
+      </p:par>
+    </p:tnLst>
+  </p:timing>
+</p:sld>
+</file>
+
+<file path=ppt/slides/slide13.xml><?xml version="1.0" encoding="utf-8"?>
+<p:sld xmlns:a="http://schemas.openxmlformats.org/drawingml/2006/main" xmlns:r="http://schemas.openxmlformats.org/officeDocument/2006/relationships" xmlns:p="http://schemas.openxmlformats.org/presentationml/2006/main">
+  <p:cSld>
+    <p:spTree>
+      <p:nvGrpSpPr>
+        <p:cNvPr id="1" name=""/>
+        <p:cNvGrpSpPr/>
+        <p:nvPr/>
+      </p:nvGrpSpPr>
+      <p:grpSpPr>
+        <a:xfrm>
+          <a:off x="0" y="0"/>
+          <a:ext cx="0" cy="0"/>
+          <a:chOff x="0" y="0"/>
+          <a:chExt cx="0" cy="0"/>
+        </a:xfrm>
+      </p:grpSpPr>
+      <p:sp>
+        <p:nvSpPr>
+          <p:cNvPr id="2" name="Title 1"/>
+          <p:cNvSpPr>
+            <a:spLocks noGrp="1"/>
+          </p:cNvSpPr>
+          <p:nvPr>
+            <p:ph type="title"/>
+          </p:nvPr>
+        </p:nvSpPr>
+        <p:spPr/>
+        <p:txBody>
+          <a:bodyPr/>
+          <a:lstStyle/>
+          <a:p>
+            <a:r>
+              <a:rPr lang="en-US" dirty="0" smtClean="0"/>
+              <a:t>Download/Install </a:t>
+            </a:r>
+            <a:r>
+              <a:rPr lang="en-US" dirty="0" err="1" smtClean="0"/>
+              <a:t>WildFly</a:t>
+            </a:r>
+            <a:endParaRPr lang="en-US" dirty="0"/>
+          </a:p>
+        </p:txBody>
+      </p:sp>
+      <p:sp>
+        <p:nvSpPr>
+          <p:cNvPr id="3" name="Content Placeholder 2"/>
+          <p:cNvSpPr>
+            <a:spLocks noGrp="1"/>
+          </p:cNvSpPr>
+          <p:nvPr>
+            <p:ph idx="1"/>
+          </p:nvPr>
+        </p:nvSpPr>
+        <p:spPr>
+          <a:xfrm>
+            <a:off x="344245" y="1825624"/>
+            <a:ext cx="11607501" cy="4930178"/>
+          </a:xfrm>
+        </p:spPr>
+        <p:txBody>
+          <a:bodyPr/>
+          <a:lstStyle/>
+          <a:p>
+            <a:r>
+              <a:rPr lang="en-US" dirty="0" smtClean="0"/>
+              <a:t>We do it with a Maven plugin, as part of the build</a:t>
+            </a:r>
+          </a:p>
+          <a:p>
+            <a:pPr lvl="1"/>
+            <a:r>
+              <a:rPr lang="en-US" dirty="0" smtClean="0"/>
+              <a:t>Note: we could use </a:t>
+            </a:r>
+            <a:r>
+              <a:rPr lang="en-US" i="1" dirty="0" smtClean="0"/>
+              <a:t>Docker</a:t>
+            </a:r>
+            <a:r>
+              <a:rPr lang="en-US" dirty="0" smtClean="0"/>
+              <a:t>… but here we just want to see how Maven plugins can be used to do several different things during the build</a:t>
+            </a:r>
+          </a:p>
+          <a:p>
+            <a:r>
+              <a:rPr lang="en-US" i="1" dirty="0" err="1" smtClean="0"/>
+              <a:t>WildFly</a:t>
+            </a:r>
+            <a:r>
+              <a:rPr lang="en-US" dirty="0" smtClean="0"/>
+              <a:t> installed under the “</a:t>
+            </a:r>
+            <a:r>
+              <a:rPr lang="en-US" i="1" dirty="0" smtClean="0"/>
+              <a:t>target</a:t>
+            </a:r>
+            <a:r>
+              <a:rPr lang="en-US" dirty="0" smtClean="0"/>
+              <a:t>” folder</a:t>
+            </a:r>
+          </a:p>
+          <a:p>
+            <a:pPr lvl="1"/>
+            <a:r>
+              <a:rPr lang="en-US" dirty="0" smtClean="0"/>
+              <a:t>So it would be deleted when running “</a:t>
+            </a:r>
+            <a:r>
+              <a:rPr lang="en-US" i="1" dirty="0" err="1" smtClean="0"/>
+              <a:t>mvn</a:t>
+            </a:r>
+            <a:r>
+              <a:rPr lang="en-US" i="1" dirty="0" smtClean="0"/>
+              <a:t> clean</a:t>
+            </a:r>
+            <a:r>
+              <a:rPr lang="en-US" dirty="0" smtClean="0"/>
+              <a:t>”</a:t>
+            </a:r>
+          </a:p>
+          <a:p>
+            <a:r>
+              <a:rPr lang="en-US" dirty="0" smtClean="0"/>
+              <a:t>Need to run “</a:t>
+            </a:r>
+            <a:r>
+              <a:rPr lang="en-US" i="1" dirty="0" err="1" smtClean="0"/>
+              <a:t>mvn</a:t>
+            </a:r>
+            <a:r>
+              <a:rPr lang="en-US" i="1" dirty="0" smtClean="0"/>
+              <a:t> test</a:t>
+            </a:r>
+            <a:r>
+              <a:rPr lang="en-US" dirty="0" smtClean="0"/>
+              <a:t>” at least once to download/install </a:t>
+            </a:r>
+            <a:r>
+              <a:rPr lang="en-US" i="1" dirty="0" err="1" smtClean="0"/>
+              <a:t>WildFly</a:t>
+            </a:r>
+            <a:r>
+              <a:rPr lang="en-US" dirty="0" smtClean="0"/>
+              <a:t> </a:t>
+            </a:r>
+            <a:r>
+              <a:rPr lang="en-US" b="1" dirty="0" smtClean="0"/>
+              <a:t>BEFORE</a:t>
+            </a:r>
+            <a:r>
+              <a:rPr lang="en-US" dirty="0" smtClean="0"/>
+              <a:t> you can run tests in IntelliJ</a:t>
+            </a:r>
+            <a:endParaRPr lang="en-US" dirty="0"/>
+          </a:p>
+        </p:txBody>
+      </p:sp>
+    </p:spTree>
+    <p:extLst>
+      <p:ext uri="{BB962C8B-B14F-4D97-AF65-F5344CB8AC3E}">
+        <p14:creationId xmlns:p14="http://schemas.microsoft.com/office/powerpoint/2010/main" val="3678567834"/>
+      </p:ext>
+    </p:extLst>
+  </p:cSld>
+  <p:clrMapOvr>
+    <a:masterClrMapping/>
+  </p:clrMapOvr>
+  <p:timing>
+    <p:tnLst>
+      <p:par>
+        <p:cTn id="1" dur="indefinite" restart="never" nodeType="tmRoot"/>
+      </p:par>
+    </p:tnLst>
+  </p:timing>
+</p:sld>
+</file>
+
+<file path=ppt/slides/slide14.xml><?xml version="1.0" encoding="utf-8"?>
+<p:sld xmlns:a="http://schemas.openxmlformats.org/drawingml/2006/main" xmlns:r="http://schemas.openxmlformats.org/officeDocument/2006/relationships" xmlns:p="http://schemas.openxmlformats.org/presentationml/2006/main">
+  <p:cSld>
+    <p:spTree>
+      <p:nvGrpSpPr>
+        <p:cNvPr id="1" name=""/>
+        <p:cNvGrpSpPr/>
+        <p:nvPr/>
+      </p:nvGrpSpPr>
+      <p:grpSpPr>
+        <a:xfrm>
+          <a:off x="0" y="0"/>
+          <a:ext cx="0" cy="0"/>
+          <a:chOff x="0" y="0"/>
+          <a:chExt cx="0" cy="0"/>
+        </a:xfrm>
+      </p:grpSpPr>
+      <p:sp>
+        <p:nvSpPr>
+          <p:cNvPr id="2" name="Title 1"/>
+          <p:cNvSpPr>
+            <a:spLocks noGrp="1"/>
+          </p:cNvSpPr>
+          <p:nvPr>
+            <p:ph type="title"/>
+          </p:nvPr>
+        </p:nvSpPr>
+        <p:spPr/>
+        <p:txBody>
+          <a:bodyPr/>
+          <a:lstStyle/>
+          <a:p>
+            <a:r>
+              <a:rPr lang="en-US" dirty="0" smtClean="0"/>
+              <a:t>Multi-Module Projects</a:t>
+            </a:r>
+            <a:endParaRPr lang="en-US" dirty="0"/>
+          </a:p>
+        </p:txBody>
+      </p:sp>
+      <p:sp>
+        <p:nvSpPr>
+          <p:cNvPr id="3" name="Content Placeholder 2"/>
+          <p:cNvSpPr>
+            <a:spLocks noGrp="1"/>
+          </p:cNvSpPr>
+          <p:nvPr>
+            <p:ph idx="1"/>
+          </p:nvPr>
+        </p:nvSpPr>
+        <p:spPr>
+          <a:xfrm>
+            <a:off x="349405" y="1825624"/>
+            <a:ext cx="11708780" cy="4961751"/>
+          </a:xfrm>
+        </p:spPr>
+        <p:txBody>
+          <a:bodyPr>
+            <a:normAutofit fontScale="92500" lnSpcReduction="20000"/>
+          </a:bodyPr>
+          <a:lstStyle/>
+          <a:p>
+            <a:r>
+              <a:rPr lang="en-US" dirty="0" smtClean="0"/>
+              <a:t>Usually, you would run </a:t>
+            </a:r>
+            <a:r>
+              <a:rPr lang="en-US" i="1" dirty="0" smtClean="0"/>
+              <a:t>Maven</a:t>
+            </a:r>
+            <a:r>
+              <a:rPr lang="en-US" dirty="0" smtClean="0"/>
+              <a:t> commands like “</a:t>
+            </a:r>
+            <a:r>
+              <a:rPr lang="en-US" i="1" dirty="0" err="1" smtClean="0"/>
+              <a:t>mvn</a:t>
+            </a:r>
+            <a:r>
+              <a:rPr lang="en-US" i="1" dirty="0" smtClean="0"/>
+              <a:t> test</a:t>
+            </a:r>
+            <a:r>
+              <a:rPr lang="en-US" dirty="0" smtClean="0"/>
+              <a:t>” directly from the root of your project</a:t>
+            </a:r>
+          </a:p>
+          <a:p>
+            <a:r>
+              <a:rPr lang="en-US" dirty="0" smtClean="0"/>
+              <a:t>TSDES is a large project: if you build from root, might take a long while…</a:t>
+            </a:r>
+          </a:p>
+          <a:p>
+            <a:pPr lvl="1"/>
+            <a:r>
+              <a:rPr lang="en-US" dirty="0" smtClean="0"/>
+              <a:t>well, “</a:t>
+            </a:r>
+            <a:r>
+              <a:rPr lang="en-US" i="1" dirty="0" smtClean="0"/>
+              <a:t>large</a:t>
+            </a:r>
+            <a:r>
+              <a:rPr lang="en-US" dirty="0" smtClean="0"/>
+              <a:t>” for students, but not compared to actual enterprise systems…</a:t>
+            </a:r>
+          </a:p>
+          <a:p>
+            <a:r>
+              <a:rPr lang="en-US" dirty="0" smtClean="0"/>
+              <a:t>If you build a module directly (</a:t>
+            </a:r>
+            <a:r>
+              <a:rPr lang="en-US" dirty="0" err="1" smtClean="0"/>
+              <a:t>eg</a:t>
+            </a:r>
+            <a:r>
+              <a:rPr lang="en-US" dirty="0" smtClean="0"/>
+              <a:t> “</a:t>
+            </a:r>
+            <a:r>
+              <a:rPr lang="en-US" i="1" dirty="0" err="1" smtClean="0"/>
+              <a:t>mvn</a:t>
+            </a:r>
+            <a:r>
+              <a:rPr lang="en-US" i="1" dirty="0" smtClean="0"/>
+              <a:t> test</a:t>
+            </a:r>
+            <a:r>
+              <a:rPr lang="en-US" dirty="0" smtClean="0"/>
+              <a:t>” in the module folder), it will fail if using other modules as dependency</a:t>
+            </a:r>
+          </a:p>
+          <a:p>
+            <a:r>
+              <a:rPr lang="en-US" dirty="0" smtClean="0"/>
+              <a:t>You need to run “</a:t>
+            </a:r>
+            <a:r>
+              <a:rPr lang="en-US" i="1" dirty="0" err="1" smtClean="0"/>
+              <a:t>mvn</a:t>
+            </a:r>
+            <a:r>
+              <a:rPr lang="en-US" i="1" dirty="0" smtClean="0"/>
+              <a:t> install -</a:t>
+            </a:r>
+            <a:r>
+              <a:rPr lang="en-US" i="1" dirty="0" err="1" smtClean="0"/>
+              <a:t>DskipTests</a:t>
+            </a:r>
+            <a:r>
+              <a:rPr lang="en-US" dirty="0" smtClean="0"/>
+              <a:t>” at least once from the root of the project</a:t>
+            </a:r>
+          </a:p>
+          <a:p>
+            <a:pPr lvl="1"/>
+            <a:r>
+              <a:rPr lang="en-US" dirty="0" smtClean="0"/>
+              <a:t>so, all JARs of the modules get installed in your </a:t>
+            </a:r>
+            <a:r>
+              <a:rPr lang="en-US" i="1" dirty="0" smtClean="0"/>
+              <a:t>~/.m2</a:t>
+            </a:r>
+            <a:r>
+              <a:rPr lang="en-US" dirty="0" smtClean="0"/>
+              <a:t> folder, and can be referenced when modules are built in isolation and not from the root of the project</a:t>
+            </a:r>
+            <a:endParaRPr lang="en-US" dirty="0"/>
+          </a:p>
+        </p:txBody>
+      </p:sp>
+    </p:spTree>
+    <p:extLst>
+      <p:ext uri="{BB962C8B-B14F-4D97-AF65-F5344CB8AC3E}">
+        <p14:creationId xmlns:p14="http://schemas.microsoft.com/office/powerpoint/2010/main" val="1990701331"/>
+      </p:ext>
+    </p:extLst>
+  </p:cSld>
+  <p:clrMapOvr>
+    <a:masterClrMapping/>
+  </p:clrMapOvr>
+</p:sld>
+</file>
+
+<file path=ppt/slides/slide15.xml><?xml version="1.0" encoding="utf-8"?>
 <p:sld xmlns:a="http://schemas.openxmlformats.org/drawingml/2006/main" xmlns:r="http://schemas.openxmlformats.org/officeDocument/2006/relationships" xmlns:p="http://schemas.openxmlformats.org/presentationml/2006/main">
   <p:cSld>
     <p:spTree>
@@ -4002,7 +4790,7 @@
               <a:t>When an EJB is run in  a JEE container (</a:t>
             </a:r>
             <a:r>
-              <a:rPr lang="en-US" dirty="0" err="1" smtClean="0"/>
+              <a:rPr lang="en-US" i="1" dirty="0" err="1" smtClean="0"/>
               <a:t>WildFly</a:t>
             </a:r>
             <a:r>
@@ -4010,7 +4798,7 @@
               <a:t>, </a:t>
             </a:r>
             <a:r>
-              <a:rPr lang="en-US" dirty="0" err="1" smtClean="0"/>
+              <a:rPr lang="en-US" i="1" dirty="0" err="1" smtClean="0"/>
               <a:t>GlassFish</a:t>
             </a:r>
             <a:r>
@@ -4071,10 +4859,10 @@
               <a:t> on an </a:t>
             </a:r>
             <a:r>
-              <a:rPr lang="en-US" dirty="0" err="1" smtClean="0"/>
+              <a:rPr lang="en-US" i="1" dirty="0" err="1" smtClean="0"/>
               <a:t>EntityManager</a:t>
             </a:r>
-            <a:endParaRPr lang="en-US" dirty="0" smtClean="0"/>
+            <a:endParaRPr lang="en-US" i="1" dirty="0" smtClean="0"/>
           </a:p>
           <a:p>
             <a:pPr lvl="1"/>
@@ -4193,11 +4981,15 @@
             </a:r>
             <a:r>
               <a:rPr lang="en-US" dirty="0" err="1" smtClean="0"/>
-              <a:t>proxyied</a:t>
-            </a:r>
-            <a:r>
-              <a:rPr lang="en-US" dirty="0" smtClean="0"/>
-              <a:t> to the actual EJB instances which are inside the proxy)</a:t>
+              <a:t>proxied</a:t>
+            </a:r>
+            <a:r>
+              <a:rPr lang="en-US" dirty="0" smtClean="0"/>
+              <a:t> </a:t>
+            </a:r>
+            <a:r>
+              <a:rPr lang="en-US" dirty="0" smtClean="0"/>
+              <a:t>to the actual EJB instances which are inside the proxy)</a:t>
             </a:r>
             <a:endParaRPr lang="en-US" dirty="0"/>
           </a:p>
@@ -5214,7 +6006,7 @@
           <a:p>
             <a:r>
               <a:rPr lang="en-US" dirty="0" smtClean="0"/>
-              <a:t>Containers</a:t>
+              <a:t>Lazy Collections</a:t>
             </a:r>
             <a:endParaRPr lang="en-US" dirty="0"/>
           </a:p>
@@ -5232,64 +6024,53 @@
         </p:nvSpPr>
         <p:spPr>
           <a:xfrm>
-            <a:off x="235389" y="1825624"/>
-            <a:ext cx="11733291" cy="4873939"/>
+            <a:off x="318782" y="1825625"/>
+            <a:ext cx="11601974" cy="4818456"/>
           </a:xfrm>
         </p:spPr>
         <p:txBody>
           <a:bodyPr>
-            <a:normAutofit fontScale="92500" lnSpcReduction="20000"/>
+            <a:normAutofit lnSpcReduction="10000"/>
           </a:bodyPr>
           <a:lstStyle/>
           <a:p>
             <a:r>
               <a:rPr lang="en-US" dirty="0" smtClean="0"/>
-              <a:t>Before, for JPA examples, we used Java SE, with Hibernate like a library</a:t>
-            </a:r>
-          </a:p>
-          <a:p>
-            <a:r>
-              <a:rPr lang="en-US" dirty="0" smtClean="0"/>
-              <a:t>For EJB, we need a JEE container</a:t>
-            </a:r>
-          </a:p>
-          <a:p>
-            <a:r>
-              <a:rPr lang="en-US" dirty="0" smtClean="0"/>
-              <a:t>We start with an embedded </a:t>
-            </a:r>
-            <a:r>
-              <a:rPr lang="en-US" dirty="0" err="1" smtClean="0"/>
-              <a:t>GlassFish</a:t>
-            </a:r>
-            <a:endParaRPr lang="en-US" dirty="0" smtClean="0"/>
-          </a:p>
-          <a:p>
-            <a:r>
-              <a:rPr lang="en-US" dirty="0" smtClean="0"/>
-              <a:t>But embedded JEE containers are just for testing, and </a:t>
+              <a:t>Collections declared with </a:t>
             </a:r>
             <a:r>
               <a:rPr lang="en-US" i="1" dirty="0" smtClean="0"/>
-              <a:t>very limited</a:t>
-            </a:r>
-            <a:r>
-              <a:rPr lang="en-US" dirty="0" smtClean="0"/>
-              <a:t> (</a:t>
-            </a:r>
-            <a:r>
-              <a:rPr lang="en-US" dirty="0" err="1" smtClean="0"/>
-              <a:t>eg</a:t>
-            </a:r>
-            <a:r>
-              <a:rPr lang="en-US" dirty="0" smtClean="0"/>
-              <a:t>, supporting transactions, but not all functionalities)</a:t>
-            </a:r>
-          </a:p>
-          <a:p>
-            <a:r>
-              <a:rPr lang="en-US" dirty="0" smtClean="0"/>
-              <a:t>Next class we see full, real container, </a:t>
+              <a:t>@</a:t>
+            </a:r>
+            <a:r>
+              <a:rPr lang="en-US" i="1" dirty="0" err="1" smtClean="0"/>
+              <a:t>OneToMany</a:t>
+            </a:r>
+            <a:r>
+              <a:rPr lang="en-US" dirty="0" smtClean="0"/>
+              <a:t> and </a:t>
+            </a:r>
+            <a:r>
+              <a:rPr lang="en-US" i="1" dirty="0" smtClean="0"/>
+              <a:t>@</a:t>
+            </a:r>
+            <a:r>
+              <a:rPr lang="en-US" i="1" dirty="0" err="1" smtClean="0"/>
+              <a:t>ManyToMany</a:t>
+            </a:r>
+            <a:r>
+              <a:rPr lang="en-US" i="1" dirty="0" smtClean="0"/>
+              <a:t> </a:t>
+            </a:r>
+            <a:r>
+              <a:rPr lang="en-US" dirty="0" smtClean="0"/>
+              <a:t>are not loaded by default </a:t>
+            </a:r>
+          </a:p>
+          <a:p>
+            <a:r>
+              <a:rPr lang="en-US" dirty="0" smtClean="0"/>
+              <a:t>They are loaded only when accessed (</a:t>
             </a:r>
             <a:r>
               <a:rPr lang="en-US" dirty="0" err="1" smtClean="0"/>
@@ -5297,57 +6078,39 @@
             </a:r>
             <a:r>
               <a:rPr lang="en-US" dirty="0" smtClean="0"/>
-              <a:t> </a:t>
-            </a:r>
-            <a:r>
-              <a:rPr lang="en-US" dirty="0" err="1" smtClean="0"/>
-              <a:t>WildFly</a:t>
-            </a:r>
-            <a:endParaRPr lang="en-US" dirty="0" smtClean="0"/>
-          </a:p>
-          <a:p>
-            <a:r>
-              <a:rPr lang="en-US" dirty="0" smtClean="0"/>
-              <a:t>But handling containers is a major PITA</a:t>
-            </a:r>
-            <a:r>
-              <a:rPr lang="mr-IN" dirty="0" smtClean="0"/>
-              <a:t>…</a:t>
-            </a:r>
-            <a:r>
-              <a:rPr lang="en-US" dirty="0" smtClean="0"/>
-              <a:t> </a:t>
-            </a:r>
-            <a:r>
-              <a:rPr lang="en-US" dirty="0" err="1" smtClean="0"/>
-              <a:t>Arquillian</a:t>
-            </a:r>
-            <a:r>
-              <a:rPr lang="en-US" dirty="0" smtClean="0"/>
-              <a:t> (next class) helps, but still a PITA</a:t>
-            </a:r>
-            <a:r>
-              <a:rPr lang="mr-IN" dirty="0" smtClean="0"/>
-              <a:t>…</a:t>
-            </a:r>
-            <a:endParaRPr lang="en-US" dirty="0" smtClean="0"/>
-          </a:p>
-          <a:p>
-            <a:r>
-              <a:rPr lang="en-US" dirty="0" smtClean="0"/>
-              <a:t>Note: life will get easier once we start with </a:t>
-            </a:r>
-            <a:r>
-              <a:rPr lang="en-US" i="1" dirty="0" err="1" smtClean="0"/>
-              <a:t>SpringBoot</a:t>
-            </a:r>
-            <a:r>
-              <a:rPr lang="mr-IN" dirty="0" smtClean="0"/>
-              <a:t>…</a:t>
-            </a:r>
-            <a:r>
-              <a:rPr lang="en-US" dirty="0" smtClean="0"/>
-              <a:t> </a:t>
+              <a:t>, </a:t>
+            </a:r>
+            <a:r>
+              <a:rPr lang="en-US" i="1" dirty="0" smtClean="0"/>
+              <a:t>lazy</a:t>
+            </a:r>
+            <a:r>
+              <a:rPr lang="en-US" dirty="0" smtClean="0"/>
+              <a:t> loading)</a:t>
+            </a:r>
+          </a:p>
+          <a:p>
+            <a:r>
+              <a:rPr lang="en-US" dirty="0" smtClean="0"/>
+              <a:t>But you need to access them inside a transaction</a:t>
+            </a:r>
+          </a:p>
+          <a:p>
+            <a:r>
+              <a:rPr lang="en-US" dirty="0" smtClean="0"/>
+              <a:t>If you try to access them outside, you will get an error</a:t>
+            </a:r>
+          </a:p>
+          <a:p>
+            <a:r>
+              <a:rPr lang="en-US" dirty="0" smtClean="0"/>
+              <a:t>So, if need such data, need to force loading by accessing them while in a transaction</a:t>
+            </a:r>
+          </a:p>
+          <a:p>
+            <a:r>
+              <a:rPr lang="en-US" dirty="0" smtClean="0"/>
+              <a:t>Note: we will go into details of transaction boundaries later in the course</a:t>
             </a:r>
             <a:endParaRPr lang="en-US" dirty="0"/>
           </a:p>
@@ -5356,7 +6119,7 @@
     </p:spTree>
     <p:extLst>
       <p:ext uri="{BB962C8B-B14F-4D97-AF65-F5344CB8AC3E}">
-        <p14:creationId xmlns:p14="http://schemas.microsoft.com/office/powerpoint/2010/main" val="401520105"/>
+        <p14:creationId xmlns:p14="http://schemas.microsoft.com/office/powerpoint/2010/main" val="569512109"/>
       </p:ext>
     </p:extLst>
   </p:cSld>

</xml_diff>